<commit_message>
updates per feedback from attendees
</commit_message>
<xml_diff>
--- a/aws-iam/aws-iam.pptx
+++ b/aws-iam/aws-iam.pptx
@@ -203,7 +203,7 @@
           <a:p>
             <a:fld id="{1B6676A5-1300-B945-98B1-DD92DDC3A3CB}" type="datetimeFigureOut">
               <a:rPr lang="en-US" smtClean="0"/>
-              <a:t>4/20/15</a:t>
+              <a:t>4/21/15</a:t>
             </a:fld>
             <a:endParaRPr lang="en-US"/>
           </a:p>
@@ -1479,6 +1479,32 @@
               <a:rPr lang="en-US" dirty="0" err="1" smtClean="0"/>
               <a:t>user.docx</a:t>
             </a:r>
+            <a:endParaRPr lang="en-US" dirty="0" smtClean="0"/>
+          </a:p>
+          <a:p>
+            <a:pPr marL="171450" indent="-171450">
+              <a:buFont typeface="Arial"/>
+              <a:buChar char="•"/>
+            </a:pPr>
+            <a:r>
+              <a:rPr lang="en-US" dirty="0" err="1" smtClean="0"/>
+              <a:t>iam</a:t>
+            </a:r>
+            <a:r>
+              <a:rPr lang="en-US" dirty="0" smtClean="0"/>
+              <a:t>-restrict-access-</a:t>
+            </a:r>
+            <a:r>
+              <a:rPr lang="en-US" dirty="0" err="1" smtClean="0"/>
+              <a:t>tag.md</a:t>
+            </a:r>
+            <a:endParaRPr lang="en-US" smtClean="0"/>
+          </a:p>
+          <a:p>
+            <a:pPr marL="0" indent="0">
+              <a:buFont typeface="Arial"/>
+              <a:buNone/>
+            </a:pPr>
             <a:endParaRPr lang="en-US" dirty="0"/>
           </a:p>
         </p:txBody>
@@ -3331,7 +3357,7 @@
           <a:p>
             <a:fld id="{7CE38E4D-051A-41E1-86A4-E56916468FD0}" type="datetimeFigureOut">
               <a:rPr lang="en-US" smtClean="0"/>
-              <a:t>4/20/15</a:t>
+              <a:t>4/21/15</a:t>
             </a:fld>
             <a:endParaRPr lang="en-US"/>
           </a:p>
@@ -3512,7 +3538,7 @@
           <a:p>
             <a:fld id="{7CE38E4D-051A-41E1-86A4-E56916468FD0}" type="datetimeFigureOut">
               <a:rPr lang="en-US" smtClean="0"/>
-              <a:t>4/20/15</a:t>
+              <a:t>4/21/15</a:t>
             </a:fld>
             <a:endParaRPr lang="en-US"/>
           </a:p>
@@ -3663,7 +3689,7 @@
           <a:p>
             <a:fld id="{7CE38E4D-051A-41E1-86A4-E56916468FD0}" type="datetimeFigureOut">
               <a:rPr lang="en-US" smtClean="0"/>
-              <a:t>4/20/15</a:t>
+              <a:t>4/21/15</a:t>
             </a:fld>
             <a:endParaRPr lang="en-US"/>
           </a:p>
@@ -5489,7 +5515,7 @@
           <a:p>
             <a:fld id="{7CE38E4D-051A-41E1-86A4-E56916468FD0}" type="datetimeFigureOut">
               <a:rPr lang="en-US" smtClean="0"/>
-              <a:t>4/20/15</a:t>
+              <a:t>4/21/15</a:t>
             </a:fld>
             <a:endParaRPr lang="en-US"/>
           </a:p>
@@ -7359,7 +7385,7 @@
           <a:p>
             <a:fld id="{7CE38E4D-051A-41E1-86A4-E56916468FD0}" type="datetimeFigureOut">
               <a:rPr lang="en-US" smtClean="0"/>
-              <a:t>4/20/15</a:t>
+              <a:t>4/21/15</a:t>
             </a:fld>
             <a:endParaRPr lang="en-US"/>
           </a:p>
@@ -7472,7 +7498,7 @@
           <a:p>
             <a:fld id="{7CE38E4D-051A-41E1-86A4-E56916468FD0}" type="datetimeFigureOut">
               <a:rPr lang="en-US" smtClean="0"/>
-              <a:t>4/20/15</a:t>
+              <a:t>4/21/15</a:t>
             </a:fld>
             <a:endParaRPr lang="en-US"/>
           </a:p>
@@ -8013,7 +8039,7 @@
           <a:p>
             <a:fld id="{7CE38E4D-051A-41E1-86A4-E56916468FD0}" type="datetimeFigureOut">
               <a:rPr lang="en-US" smtClean="0"/>
-              <a:t>4/20/15</a:t>
+              <a:t>4/21/15</a:t>
             </a:fld>
             <a:endParaRPr lang="en-US"/>
           </a:p>
@@ -8126,7 +8152,7 @@
           <a:p>
             <a:fld id="{7CE38E4D-051A-41E1-86A4-E56916468FD0}" type="datetimeFigureOut">
               <a:rPr lang="en-US" smtClean="0"/>
-              <a:t>4/20/15</a:t>
+              <a:t>4/21/15</a:t>
             </a:fld>
             <a:endParaRPr lang="en-US"/>
           </a:p>
@@ -9837,7 +9863,7 @@
           <a:p>
             <a:fld id="{7CE38E4D-051A-41E1-86A4-E56916468FD0}" type="datetimeFigureOut">
               <a:rPr lang="en-US" smtClean="0"/>
-              <a:t>4/20/15</a:t>
+              <a:t>4/21/15</a:t>
             </a:fld>
             <a:endParaRPr lang="en-US"/>
           </a:p>
@@ -9988,7 +10014,7 @@
           <a:p>
             <a:fld id="{7CE38E4D-051A-41E1-86A4-E56916468FD0}" type="datetimeFigureOut">
               <a:rPr lang="en-US" smtClean="0"/>
-              <a:t>4/20/15</a:t>
+              <a:t>4/21/15</a:t>
             </a:fld>
             <a:endParaRPr lang="en-US"/>
           </a:p>
@@ -13603,7 +13629,7 @@
           <a:p>
             <a:fld id="{7CE38E4D-051A-41E1-86A4-E56916468FD0}" type="datetimeFigureOut">
               <a:rPr lang="en-US" smtClean="0"/>
-              <a:t>4/20/15</a:t>
+              <a:t>4/21/15</a:t>
             </a:fld>
             <a:endParaRPr lang="en-US"/>
           </a:p>
@@ -15462,7 +15488,7 @@
           <a:p>
             <a:fld id="{7CE38E4D-051A-41E1-86A4-E56916468FD0}" type="datetimeFigureOut">
               <a:rPr lang="en-US" smtClean="0"/>
-              <a:t>4/20/15</a:t>
+              <a:t>4/21/15</a:t>
             </a:fld>
             <a:endParaRPr lang="en-US"/>
           </a:p>
@@ -16328,10 +16354,19 @@
         <p:spPr/>
         <p:txBody>
           <a:bodyPr>
-            <a:normAutofit/>
+            <a:normAutofit fontScale="92500" lnSpcReduction="10000"/>
           </a:bodyPr>
           <a:lstStyle/>
           <a:p>
+            <a:pPr marL="0" indent="0">
+              <a:buNone/>
+            </a:pPr>
+            <a:r>
+              <a:rPr lang="en-US" dirty="0" smtClean="0"/>
+              <a:t>Create IAM User and Group:</a:t>
+            </a:r>
+          </a:p>
+          <a:p>
             <a:r>
               <a:rPr lang="en-US" dirty="0" smtClean="0"/>
               <a:t>Create an IAM Group</a:t>
@@ -16340,23 +16375,51 @@
           <a:p>
             <a:r>
               <a:rPr lang="en-US" dirty="0" smtClean="0"/>
-              <a:t>Attach a Managed Policy to the Group</a:t>
-            </a:r>
-          </a:p>
-          <a:p>
+              <a:t>Create an IAM User</a:t>
+            </a:r>
+          </a:p>
+          <a:p>
+            <a:pPr marL="0" indent="0">
+              <a:buNone/>
+            </a:pPr>
             <a:r>
               <a:rPr lang="en-US" dirty="0" smtClean="0"/>
-              <a:t>Create an IAM User</a:t>
+              <a:t>Create a Limited Access IAM User and Test:</a:t>
             </a:r>
           </a:p>
           <a:p>
             <a:r>
               <a:rPr lang="en-US" dirty="0" smtClean="0"/>
-              <a:t>Add IAM User to Group</a:t>
-            </a:r>
-          </a:p>
-          <a:p>
-            <a:endParaRPr lang="en-US" dirty="0" smtClean="0"/>
+              <a:t>Create an IAM Policy</a:t>
+            </a:r>
+          </a:p>
+          <a:p>
+            <a:r>
+              <a:rPr lang="en-US" dirty="0" smtClean="0"/>
+              <a:t>Create a user</a:t>
+            </a:r>
+          </a:p>
+          <a:p>
+            <a:r>
+              <a:rPr lang="en-US" dirty="0" smtClean="0"/>
+              <a:t>Apply Policy to user – allow access to resource by Tag</a:t>
+            </a:r>
+          </a:p>
+          <a:p>
+            <a:r>
+              <a:rPr lang="en-US" dirty="0" smtClean="0"/>
+              <a:t>Test Access Policy</a:t>
+            </a:r>
+          </a:p>
+          <a:p>
+            <a:pPr marL="0" indent="0">
+              <a:buNone/>
+            </a:pPr>
+            <a:r>
+              <a:rPr lang="en-US" smtClean="0"/>
+              <a:t>Create </a:t>
+            </a:r>
+            <a:endParaRPr lang="en-US" dirty="0"/>
           </a:p>
           <a:p>
             <a:endParaRPr lang="en-US" dirty="0" smtClean="0"/>
@@ -16382,7 +16445,11 @@
           <a:p>
             <a:r>
               <a:rPr lang="en-US" dirty="0" smtClean="0"/>
-              <a:t>Hands On: Create an IAM User</a:t>
+              <a:t>Hands On: </a:t>
+            </a:r>
+            <a:r>
+              <a:rPr lang="en-US" dirty="0" smtClean="0"/>
+              <a:t>IAM</a:t>
             </a:r>
             <a:endParaRPr lang="en-US" dirty="0"/>
           </a:p>

</xml_diff>

<commit_message>
one more IAM will it delete
</commit_message>
<xml_diff>
--- a/aws-iam/aws-iam.pptx
+++ b/aws-iam/aws-iam.pptx
@@ -5,7 +5,7 @@
     <p:sldMasterId id="2147483677" r:id="rId1"/>
   </p:sldMasterIdLst>
   <p:notesMasterIdLst>
-    <p:notesMasterId r:id="rId19"/>
+    <p:notesMasterId r:id="rId20"/>
   </p:notesMasterIdLst>
   <p:sldIdLst>
     <p:sldId id="256" r:id="rId2"/>
@@ -17,14 +17,15 @@
     <p:sldId id="291" r:id="rId8"/>
     <p:sldId id="292" r:id="rId9"/>
     <p:sldId id="290" r:id="rId10"/>
-    <p:sldId id="280" r:id="rId11"/>
-    <p:sldId id="283" r:id="rId12"/>
-    <p:sldId id="278" r:id="rId13"/>
-    <p:sldId id="286" r:id="rId14"/>
-    <p:sldId id="279" r:id="rId15"/>
-    <p:sldId id="277" r:id="rId16"/>
-    <p:sldId id="287" r:id="rId17"/>
-    <p:sldId id="258" r:id="rId18"/>
+    <p:sldId id="293" r:id="rId11"/>
+    <p:sldId id="280" r:id="rId12"/>
+    <p:sldId id="283" r:id="rId13"/>
+    <p:sldId id="278" r:id="rId14"/>
+    <p:sldId id="286" r:id="rId15"/>
+    <p:sldId id="279" r:id="rId16"/>
+    <p:sldId id="277" r:id="rId17"/>
+    <p:sldId id="287" r:id="rId18"/>
+    <p:sldId id="258" r:id="rId19"/>
   </p:sldIdLst>
   <p:sldSz cx="9144000" cy="6858000" type="screen4x3"/>
   <p:notesSz cx="6858000" cy="9144000"/>
@@ -628,7 +629,7 @@
           <a:p>
             <a:r>
               <a:rPr lang="en-US" dirty="0" smtClean="0"/>
-              <a:t>References:</a:t>
+              <a:t>Reference:</a:t>
             </a:r>
           </a:p>
           <a:p>
@@ -638,7 +639,7 @@
             </a:pPr>
             <a:r>
               <a:rPr lang="en-US" dirty="0" smtClean="0"/>
-              <a:t>ARN Identification: http://</a:t>
+              <a:t>http://</a:t>
             </a:r>
             <a:r>
               <a:rPr lang="en-US" dirty="0" err="1" smtClean="0"/>
@@ -646,54 +647,19 @@
             </a:r>
             <a:r>
               <a:rPr lang="en-US" dirty="0" smtClean="0"/>
-              <a:t>/general/latest/gr/</a:t>
+              <a:t>/IAM/latest/</a:t>
             </a:r>
             <a:r>
               <a:rPr lang="en-US" dirty="0" err="1" smtClean="0"/>
-              <a:t>aws</a:t>
+              <a:t>UserGuide</a:t>
             </a:r>
             <a:r>
               <a:rPr lang="en-US" dirty="0" smtClean="0"/>
-              <a:t>-</a:t>
+              <a:t>/</a:t>
             </a:r>
             <a:r>
               <a:rPr lang="en-US" dirty="0" err="1" smtClean="0"/>
-              <a:t>arns</a:t>
-            </a:r>
-            <a:r>
-              <a:rPr lang="en-US" dirty="0" smtClean="0"/>
-              <a:t>-and-</a:t>
-            </a:r>
-            <a:r>
-              <a:rPr lang="en-US" dirty="0" err="1" smtClean="0"/>
-              <a:t>namespaces.html</a:t>
-            </a:r>
-            <a:endParaRPr lang="en-US" dirty="0" smtClean="0"/>
-          </a:p>
-          <a:p>
-            <a:pPr marL="171450" indent="-171450">
-              <a:buFont typeface="Arial"/>
-              <a:buChar char="•"/>
-            </a:pPr>
-            <a:r>
-              <a:rPr lang="en-US" dirty="0" smtClean="0"/>
-              <a:t>Service</a:t>
-            </a:r>
-            <a:r>
-              <a:rPr lang="en-US" baseline="0" dirty="0" smtClean="0"/>
-              <a:t> Namespaces: http://</a:t>
-            </a:r>
-            <a:r>
-              <a:rPr lang="en-US" baseline="0" dirty="0" err="1" smtClean="0"/>
-              <a:t>docs.aws.amazon.com</a:t>
-            </a:r>
-            <a:r>
-              <a:rPr lang="en-US" baseline="0" dirty="0" smtClean="0"/>
-              <a:t>/general/latest/gr/</a:t>
-            </a:r>
-            <a:r>
-              <a:rPr lang="en-US" baseline="0" dirty="0" err="1" smtClean="0"/>
-              <a:t>aws-arns-and-namespaces.html#genref-aws-service-namespaces</a:t>
+              <a:t>PolicyVariables.html</a:t>
             </a:r>
             <a:endParaRPr lang="en-US" dirty="0"/>
           </a:p>
@@ -725,7 +691,7 @@
     </p:spTree>
     <p:extLst>
       <p:ext uri="{BB962C8B-B14F-4D97-AF65-F5344CB8AC3E}">
-        <p14:creationId xmlns:p14="http://schemas.microsoft.com/office/powerpoint/2010/main" val="3147512962"/>
+        <p14:creationId xmlns:p14="http://schemas.microsoft.com/office/powerpoint/2010/main" val="305666501"/>
       </p:ext>
     </p:extLst>
   </p:cSld>
@@ -781,7 +747,7 @@
           <a:p>
             <a:r>
               <a:rPr lang="en-US" dirty="0" smtClean="0"/>
-              <a:t>Reference:</a:t>
+              <a:t>References:</a:t>
             </a:r>
           </a:p>
           <a:p>
@@ -791,7 +757,7 @@
             </a:pPr>
             <a:r>
               <a:rPr lang="en-US" dirty="0" smtClean="0"/>
-              <a:t>Role for EC2: http://</a:t>
+              <a:t>ARN Identification: http://</a:t>
             </a:r>
             <a:r>
               <a:rPr lang="en-US" dirty="0" err="1" smtClean="0"/>
@@ -799,15 +765,54 @@
             </a:r>
             <a:r>
               <a:rPr lang="en-US" dirty="0" smtClean="0"/>
-              <a:t>/AWSEC2/latest/</a:t>
+              <a:t>/general/latest/gr/</a:t>
             </a:r>
             <a:r>
               <a:rPr lang="en-US" dirty="0" err="1" smtClean="0"/>
-              <a:t>UserGuide</a:t>
+              <a:t>aws</a:t>
             </a:r>
             <a:r>
               <a:rPr lang="en-US" dirty="0" smtClean="0"/>
-              <a:t>/iam-roles-for-amazon-ec2.html</a:t>
+              <a:t>-</a:t>
+            </a:r>
+            <a:r>
+              <a:rPr lang="en-US" dirty="0" err="1" smtClean="0"/>
+              <a:t>arns</a:t>
+            </a:r>
+            <a:r>
+              <a:rPr lang="en-US" dirty="0" smtClean="0"/>
+              <a:t>-and-</a:t>
+            </a:r>
+            <a:r>
+              <a:rPr lang="en-US" dirty="0" err="1" smtClean="0"/>
+              <a:t>namespaces.html</a:t>
+            </a:r>
+            <a:endParaRPr lang="en-US" dirty="0" smtClean="0"/>
+          </a:p>
+          <a:p>
+            <a:pPr marL="171450" indent="-171450">
+              <a:buFont typeface="Arial"/>
+              <a:buChar char="•"/>
+            </a:pPr>
+            <a:r>
+              <a:rPr lang="en-US" dirty="0" smtClean="0"/>
+              <a:t>Service</a:t>
+            </a:r>
+            <a:r>
+              <a:rPr lang="en-US" baseline="0" dirty="0" smtClean="0"/>
+              <a:t> Namespaces: http://</a:t>
+            </a:r>
+            <a:r>
+              <a:rPr lang="en-US" baseline="0" dirty="0" err="1" smtClean="0"/>
+              <a:t>docs.aws.amazon.com</a:t>
+            </a:r>
+            <a:r>
+              <a:rPr lang="en-US" baseline="0" dirty="0" smtClean="0"/>
+              <a:t>/general/latest/gr/</a:t>
+            </a:r>
+            <a:r>
+              <a:rPr lang="en-US" baseline="0" dirty="0" err="1" smtClean="0"/>
+              <a:t>aws-arns-and-namespaces.html#genref-aws-service-namespaces</a:t>
             </a:r>
             <a:endParaRPr lang="en-US" dirty="0"/>
           </a:p>
@@ -839,7 +844,7 @@
     </p:spTree>
     <p:extLst>
       <p:ext uri="{BB962C8B-B14F-4D97-AF65-F5344CB8AC3E}">
-        <p14:creationId xmlns:p14="http://schemas.microsoft.com/office/powerpoint/2010/main" val="3986410793"/>
+        <p14:creationId xmlns:p14="http://schemas.microsoft.com/office/powerpoint/2010/main" val="3147512962"/>
       </p:ext>
     </p:extLst>
   </p:cSld>
@@ -895,7 +900,7 @@
           <a:p>
             <a:r>
               <a:rPr lang="en-US" dirty="0" smtClean="0"/>
-              <a:t>References:</a:t>
+              <a:t>Reference:</a:t>
             </a:r>
           </a:p>
           <a:p>
@@ -905,58 +910,23 @@
             </a:pPr>
             <a:r>
               <a:rPr lang="en-US" dirty="0" smtClean="0"/>
-              <a:t>IAM Best Practices:</a:t>
-            </a:r>
-            <a:r>
-              <a:rPr lang="en-US" baseline="0" dirty="0" smtClean="0"/>
-              <a:t> http://</a:t>
-            </a:r>
-            <a:r>
-              <a:rPr lang="en-US" baseline="0" dirty="0" err="1" smtClean="0"/>
+              <a:t>Role for EC2: http://</a:t>
+            </a:r>
+            <a:r>
+              <a:rPr lang="en-US" dirty="0" err="1" smtClean="0"/>
               <a:t>docs.aws.amazon.com</a:t>
             </a:r>
             <a:r>
-              <a:rPr lang="en-US" baseline="0" dirty="0" smtClean="0"/>
-              <a:t>/IAM/latest/</a:t>
-            </a:r>
-            <a:r>
-              <a:rPr lang="en-US" baseline="0" dirty="0" err="1" smtClean="0"/>
+              <a:rPr lang="en-US" dirty="0" smtClean="0"/>
+              <a:t>/AWSEC2/latest/</a:t>
+            </a:r>
+            <a:r>
+              <a:rPr lang="en-US" dirty="0" err="1" smtClean="0"/>
               <a:t>UserGuide</a:t>
             </a:r>
             <a:r>
-              <a:rPr lang="en-US" baseline="0" dirty="0" smtClean="0"/>
-              <a:t>/</a:t>
-            </a:r>
-            <a:r>
-              <a:rPr lang="en-US" baseline="0" dirty="0" err="1" smtClean="0"/>
-              <a:t>IAMBestPractices.html</a:t>
-            </a:r>
-            <a:endParaRPr lang="en-US" baseline="0" dirty="0" smtClean="0"/>
-          </a:p>
-          <a:p>
-            <a:pPr marL="171450" indent="-171450">
-              <a:buFont typeface="Arial"/>
-              <a:buChar char="•"/>
-            </a:pPr>
-            <a:r>
               <a:rPr lang="en-US" dirty="0" smtClean="0"/>
-              <a:t>http://</a:t>
-            </a:r>
-            <a:r>
-              <a:rPr lang="en-US" dirty="0" err="1" smtClean="0"/>
-              <a:t>aws.amazon.com</a:t>
-            </a:r>
-            <a:r>
-              <a:rPr lang="en-US" dirty="0" smtClean="0"/>
-              <a:t>/</a:t>
-            </a:r>
-            <a:r>
-              <a:rPr lang="en-US" dirty="0" err="1" smtClean="0"/>
-              <a:t>iam</a:t>
-            </a:r>
-            <a:r>
-              <a:rPr lang="en-US" dirty="0" smtClean="0"/>
-              <a:t>/details/manage-users/</a:t>
+              <a:t>/iam-roles-for-amazon-ec2.html</a:t>
             </a:r>
             <a:endParaRPr lang="en-US" dirty="0"/>
           </a:p>
@@ -988,7 +958,7 @@
     </p:spTree>
     <p:extLst>
       <p:ext uri="{BB962C8B-B14F-4D97-AF65-F5344CB8AC3E}">
-        <p14:creationId xmlns:p14="http://schemas.microsoft.com/office/powerpoint/2010/main" val="1619447160"/>
+        <p14:creationId xmlns:p14="http://schemas.microsoft.com/office/powerpoint/2010/main" val="3986410793"/>
       </p:ext>
     </p:extLst>
   </p:cSld>
@@ -1042,6 +1012,71 @@
           <a:bodyPr/>
           <a:lstStyle/>
           <a:p>
+            <a:r>
+              <a:rPr lang="en-US" dirty="0" smtClean="0"/>
+              <a:t>References:</a:t>
+            </a:r>
+          </a:p>
+          <a:p>
+            <a:pPr marL="171450" indent="-171450">
+              <a:buFont typeface="Arial"/>
+              <a:buChar char="•"/>
+            </a:pPr>
+            <a:r>
+              <a:rPr lang="en-US" dirty="0" smtClean="0"/>
+              <a:t>IAM Best Practices:</a:t>
+            </a:r>
+            <a:r>
+              <a:rPr lang="en-US" baseline="0" dirty="0" smtClean="0"/>
+              <a:t> http://</a:t>
+            </a:r>
+            <a:r>
+              <a:rPr lang="en-US" baseline="0" dirty="0" err="1" smtClean="0"/>
+              <a:t>docs.aws.amazon.com</a:t>
+            </a:r>
+            <a:r>
+              <a:rPr lang="en-US" baseline="0" dirty="0" smtClean="0"/>
+              <a:t>/IAM/latest/</a:t>
+            </a:r>
+            <a:r>
+              <a:rPr lang="en-US" baseline="0" dirty="0" err="1" smtClean="0"/>
+              <a:t>UserGuide</a:t>
+            </a:r>
+            <a:r>
+              <a:rPr lang="en-US" baseline="0" dirty="0" smtClean="0"/>
+              <a:t>/</a:t>
+            </a:r>
+            <a:r>
+              <a:rPr lang="en-US" baseline="0" dirty="0" err="1" smtClean="0"/>
+              <a:t>IAMBestPractices.html</a:t>
+            </a:r>
+            <a:endParaRPr lang="en-US" baseline="0" dirty="0" smtClean="0"/>
+          </a:p>
+          <a:p>
+            <a:pPr marL="171450" indent="-171450">
+              <a:buFont typeface="Arial"/>
+              <a:buChar char="•"/>
+            </a:pPr>
+            <a:r>
+              <a:rPr lang="en-US" dirty="0" smtClean="0"/>
+              <a:t>http://</a:t>
+            </a:r>
+            <a:r>
+              <a:rPr lang="en-US" dirty="0" err="1" smtClean="0"/>
+              <a:t>aws.amazon.com</a:t>
+            </a:r>
+            <a:r>
+              <a:rPr lang="en-US" dirty="0" smtClean="0"/>
+              <a:t>/</a:t>
+            </a:r>
+            <a:r>
+              <a:rPr lang="en-US" dirty="0" err="1" smtClean="0"/>
+              <a:t>iam</a:t>
+            </a:r>
+            <a:r>
+              <a:rPr lang="en-US" dirty="0" smtClean="0"/>
+              <a:t>/details/manage-users/</a:t>
+            </a:r>
             <a:endParaRPr lang="en-US" dirty="0"/>
           </a:p>
         </p:txBody>
@@ -1126,62 +1161,6 @@
           <a:bodyPr/>
           <a:lstStyle/>
           <a:p>
-            <a:r>
-              <a:rPr lang="en-US" dirty="0" smtClean="0"/>
-              <a:t>Hands</a:t>
-            </a:r>
-            <a:r>
-              <a:rPr lang="en-US" baseline="0" dirty="0" smtClean="0"/>
-              <a:t> On Files</a:t>
-            </a:r>
-            <a:r>
-              <a:rPr lang="en-US" dirty="0" smtClean="0"/>
-              <a:t>:</a:t>
-            </a:r>
-          </a:p>
-          <a:p>
-            <a:pPr marL="171450" indent="-171450">
-              <a:buFont typeface="Arial"/>
-              <a:buChar char="•"/>
-            </a:pPr>
-            <a:r>
-              <a:rPr lang="en-US" dirty="0" err="1" smtClean="0"/>
-              <a:t>iam</a:t>
-            </a:r>
-            <a:r>
-              <a:rPr lang="en-US" dirty="0" smtClean="0"/>
-              <a:t>-create-group-</a:t>
-            </a:r>
-            <a:r>
-              <a:rPr lang="en-US" dirty="0" err="1" smtClean="0"/>
-              <a:t>user.docx</a:t>
-            </a:r>
-            <a:endParaRPr lang="en-US" dirty="0" smtClean="0"/>
-          </a:p>
-          <a:p>
-            <a:pPr marL="171450" indent="-171450">
-              <a:buFont typeface="Arial"/>
-              <a:buChar char="•"/>
-            </a:pPr>
-            <a:r>
-              <a:rPr lang="en-US" dirty="0" err="1" smtClean="0"/>
-              <a:t>iam</a:t>
-            </a:r>
-            <a:r>
-              <a:rPr lang="en-US" dirty="0" smtClean="0"/>
-              <a:t>-restrict-access-</a:t>
-            </a:r>
-            <a:r>
-              <a:rPr lang="en-US" dirty="0" err="1" smtClean="0"/>
-              <a:t>tag.md</a:t>
-            </a:r>
-            <a:endParaRPr lang="en-US" smtClean="0"/>
-          </a:p>
-          <a:p>
-            <a:pPr marL="0" indent="0">
-              <a:buFont typeface="Arial"/>
-              <a:buNone/>
-            </a:pPr>
             <a:endParaRPr lang="en-US" dirty="0"/>
           </a:p>
         </p:txBody>
@@ -1204,6 +1183,146 @@
             <a:fld id="{BFB43062-714D-1146-A97F-0D45BD9E7BF0}" type="slidenum">
               <a:rPr lang="en-US" smtClean="0"/>
               <a:t>17</a:t>
+            </a:fld>
+            <a:endParaRPr lang="en-US"/>
+          </a:p>
+        </p:txBody>
+      </p:sp>
+    </p:spTree>
+    <p:extLst>
+      <p:ext uri="{BB962C8B-B14F-4D97-AF65-F5344CB8AC3E}">
+        <p14:creationId xmlns:p14="http://schemas.microsoft.com/office/powerpoint/2010/main" val="1619447160"/>
+      </p:ext>
+    </p:extLst>
+  </p:cSld>
+  <p:clrMapOvr>
+    <a:masterClrMapping/>
+  </p:clrMapOvr>
+</p:notes>
+</file>
+
+<file path=ppt/notesSlides/notesSlide15.xml><?xml version="1.0" encoding="utf-8"?>
+<p:notes xmlns:a="http://schemas.openxmlformats.org/drawingml/2006/main" xmlns:r="http://schemas.openxmlformats.org/officeDocument/2006/relationships" xmlns:p="http://schemas.openxmlformats.org/presentationml/2006/main">
+  <p:cSld>
+    <p:spTree>
+      <p:nvGrpSpPr>
+        <p:cNvPr id="1" name=""/>
+        <p:cNvGrpSpPr/>
+        <p:nvPr/>
+      </p:nvGrpSpPr>
+      <p:grpSpPr>
+        <a:xfrm>
+          <a:off x="0" y="0"/>
+          <a:ext cx="0" cy="0"/>
+          <a:chOff x="0" y="0"/>
+          <a:chExt cx="0" cy="0"/>
+        </a:xfrm>
+      </p:grpSpPr>
+      <p:sp>
+        <p:nvSpPr>
+          <p:cNvPr id="2" name="Slide Image Placeholder 1"/>
+          <p:cNvSpPr>
+            <a:spLocks noGrp="1" noRot="1" noChangeAspect="1"/>
+          </p:cNvSpPr>
+          <p:nvPr>
+            <p:ph type="sldImg"/>
+          </p:nvPr>
+        </p:nvSpPr>
+        <p:spPr/>
+      </p:sp>
+      <p:sp>
+        <p:nvSpPr>
+          <p:cNvPr id="3" name="Notes Placeholder 2"/>
+          <p:cNvSpPr>
+            <a:spLocks noGrp="1"/>
+          </p:cNvSpPr>
+          <p:nvPr>
+            <p:ph type="body" idx="1"/>
+          </p:nvPr>
+        </p:nvSpPr>
+        <p:spPr/>
+        <p:txBody>
+          <a:bodyPr/>
+          <a:lstStyle/>
+          <a:p>
+            <a:r>
+              <a:rPr lang="en-US" dirty="0" smtClean="0"/>
+              <a:t>Hands</a:t>
+            </a:r>
+            <a:r>
+              <a:rPr lang="en-US" baseline="0" dirty="0" smtClean="0"/>
+              <a:t> On Files</a:t>
+            </a:r>
+            <a:r>
+              <a:rPr lang="en-US" dirty="0" smtClean="0"/>
+              <a:t>:</a:t>
+            </a:r>
+          </a:p>
+          <a:p>
+            <a:pPr marL="171450" indent="-171450">
+              <a:buFont typeface="Arial"/>
+              <a:buChar char="•"/>
+            </a:pPr>
+            <a:r>
+              <a:rPr lang="en-US" dirty="0" err="1" smtClean="0"/>
+              <a:t>iam</a:t>
+            </a:r>
+            <a:r>
+              <a:rPr lang="en-US" dirty="0" smtClean="0"/>
+              <a:t>-create-group-</a:t>
+            </a:r>
+            <a:r>
+              <a:rPr lang="en-US" dirty="0" err="1" smtClean="0"/>
+              <a:t>user.docx</a:t>
+            </a:r>
+            <a:endParaRPr lang="en-US" dirty="0" smtClean="0"/>
+          </a:p>
+          <a:p>
+            <a:pPr marL="171450" indent="-171450">
+              <a:buFont typeface="Arial"/>
+              <a:buChar char="•"/>
+            </a:pPr>
+            <a:r>
+              <a:rPr lang="en-US" dirty="0" err="1" smtClean="0"/>
+              <a:t>iam</a:t>
+            </a:r>
+            <a:r>
+              <a:rPr lang="en-US" dirty="0" smtClean="0"/>
+              <a:t>-restrict-access-</a:t>
+            </a:r>
+            <a:r>
+              <a:rPr lang="en-US" dirty="0" err="1" smtClean="0"/>
+              <a:t>tag.md</a:t>
+            </a:r>
+            <a:endParaRPr lang="en-US" smtClean="0"/>
+          </a:p>
+          <a:p>
+            <a:pPr marL="0" indent="0">
+              <a:buFont typeface="Arial"/>
+              <a:buNone/>
+            </a:pPr>
+            <a:endParaRPr lang="en-US" dirty="0"/>
+          </a:p>
+        </p:txBody>
+      </p:sp>
+      <p:sp>
+        <p:nvSpPr>
+          <p:cNvPr id="4" name="Slide Number Placeholder 3"/>
+          <p:cNvSpPr>
+            <a:spLocks noGrp="1"/>
+          </p:cNvSpPr>
+          <p:nvPr>
+            <p:ph type="sldNum" sz="quarter" idx="10"/>
+          </p:nvPr>
+        </p:nvSpPr>
+        <p:spPr/>
+        <p:txBody>
+          <a:bodyPr/>
+          <a:lstStyle/>
+          <a:p>
+            <a:fld id="{BFB43062-714D-1146-A97F-0D45BD9E7BF0}" type="slidenum">
+              <a:rPr lang="en-US" smtClean="0"/>
+              <a:t>18</a:t>
             </a:fld>
             <a:endParaRPr lang="en-US"/>
           </a:p>
@@ -2132,45 +2251,192 @@
           <a:p>
             <a:r>
               <a:rPr lang="en-US" dirty="0" smtClean="0"/>
-              <a:t>Reference:</a:t>
-            </a:r>
-          </a:p>
-          <a:p>
-            <a:pPr marL="171450" indent="-171450">
-              <a:buFont typeface="Arial"/>
-              <a:buChar char="•"/>
+              <a:t>Answer: </a:t>
+            </a:r>
+            <a:r>
+              <a:rPr lang="en-US" dirty="0" smtClean="0"/>
+              <a:t>Depends. </a:t>
+            </a:r>
+            <a:r>
+              <a:rPr lang="en-US" dirty="0" smtClean="0"/>
+              <a:t>Result of policy</a:t>
+            </a:r>
+            <a:r>
+              <a:rPr lang="en-US" baseline="0" dirty="0" smtClean="0"/>
+              <a:t> evaluation</a:t>
+            </a:r>
+            <a:r>
+              <a:rPr lang="en-US" dirty="0" smtClean="0"/>
+              <a:t>:</a:t>
+            </a:r>
+          </a:p>
+          <a:p>
+            <a:pPr marL="228600" indent="-228600">
+              <a:buAutoNum type="arabicPeriod"/>
             </a:pPr>
             <a:r>
               <a:rPr lang="en-US" dirty="0" smtClean="0"/>
-              <a:t>http://</a:t>
-            </a:r>
-            <a:r>
-              <a:rPr lang="en-US" dirty="0" err="1" smtClean="0"/>
-              <a:t>docs.aws.amazon.com</a:t>
-            </a:r>
-            <a:r>
-              <a:rPr lang="en-US" dirty="0" smtClean="0"/>
-              <a:t>/IAM/latest/</a:t>
-            </a:r>
-            <a:r>
-              <a:rPr lang="en-US" dirty="0" err="1" smtClean="0"/>
-              <a:t>UserGuide</a:t>
-            </a:r>
-            <a:r>
-              <a:rPr lang="en-US" dirty="0" smtClean="0"/>
-              <a:t>/policies-managed-</a:t>
-            </a:r>
-            <a:r>
-              <a:rPr lang="en-US" dirty="0" err="1" smtClean="0"/>
-              <a:t>vs</a:t>
-            </a:r>
-            <a:r>
-              <a:rPr lang="en-US" dirty="0" smtClean="0"/>
-              <a:t>-</a:t>
-            </a:r>
-            <a:r>
-              <a:rPr lang="en-US" dirty="0" err="1" smtClean="0"/>
-              <a:t>inline.html</a:t>
+              <a:t>The terminate-instances</a:t>
+            </a:r>
+            <a:r>
+              <a:rPr lang="en-US" baseline="0" dirty="0" smtClean="0"/>
+              <a:t> command in the resource context does not match the commands allowed in the “Action” element in the given policy.</a:t>
+            </a:r>
+          </a:p>
+          <a:p>
+            <a:pPr marL="228600" indent="-228600">
+              <a:buAutoNum type="arabicPeriod"/>
+            </a:pPr>
+            <a:r>
+              <a:rPr lang="en-US" baseline="0" dirty="0" smtClean="0"/>
+              <a:t>The resource (</a:t>
+            </a:r>
+            <a:r>
+              <a:rPr lang="de-DE" baseline="0" dirty="0" smtClean="0"/>
+              <a:t>i-8f00e559)</a:t>
+            </a:r>
+            <a:r>
+              <a:rPr lang="en-US" baseline="0" dirty="0" smtClean="0"/>
+              <a:t> on which an action is requested matches the resource given in the resource context, but in this case the action is not allowed</a:t>
+            </a:r>
+            <a:r>
+              <a:rPr lang="en-US" baseline="0" dirty="0" smtClean="0"/>
+              <a:t>.</a:t>
+            </a:r>
+          </a:p>
+          <a:p>
+            <a:pPr marL="228600" marR="0" indent="-228600" algn="l" defTabSz="457200" rtl="0" eaLnBrk="1" fontAlgn="auto" latinLnBrk="0" hangingPunct="1">
+              <a:lnSpc>
+                <a:spcPct val="100000"/>
+              </a:lnSpc>
+              <a:spcBef>
+                <a:spcPts val="0"/>
+              </a:spcBef>
+              <a:spcAft>
+                <a:spcPts val="0"/>
+              </a:spcAft>
+              <a:buClrTx/>
+              <a:buSzTx/>
+              <a:buFontTx/>
+              <a:buAutoNum type="arabicPeriod"/>
+              <a:tabLst/>
+              <a:defRPr/>
+            </a:pPr>
+            <a:r>
+              <a:rPr lang="en-US" baseline="0" dirty="0" smtClean="0"/>
+              <a:t>The </a:t>
+            </a:r>
+            <a:r>
+              <a:rPr lang="en-US" baseline="0" dirty="0" err="1" smtClean="0"/>
+              <a:t>CurrentTime</a:t>
+            </a:r>
+            <a:r>
+              <a:rPr lang="en-US" baseline="0" dirty="0" smtClean="0"/>
+              <a:t> (</a:t>
+            </a:r>
+            <a:r>
+              <a:rPr lang="en-US" baseline="0" dirty="0" err="1" smtClean="0"/>
+              <a:t>yyyy-mm-ddThh:mm:ssZ</a:t>
+            </a:r>
+            <a:r>
+              <a:rPr lang="de-DE" baseline="0" dirty="0" smtClean="0"/>
+              <a:t>) </a:t>
+            </a:r>
+            <a:r>
+              <a:rPr lang="de-DE" baseline="0" dirty="0" err="1" smtClean="0"/>
+              <a:t>value</a:t>
+            </a:r>
+            <a:r>
+              <a:rPr lang="de-DE" baseline="0" dirty="0" smtClean="0"/>
+              <a:t> in </a:t>
+            </a:r>
+            <a:r>
+              <a:rPr lang="de-DE" baseline="0" dirty="0" err="1" smtClean="0"/>
+              <a:t>the</a:t>
+            </a:r>
+            <a:r>
+              <a:rPr lang="de-DE" baseline="0" dirty="0" smtClean="0"/>
+              <a:t> </a:t>
+            </a:r>
+            <a:r>
+              <a:rPr lang="de-DE" baseline="0" dirty="0" err="1" smtClean="0"/>
+              <a:t>resource</a:t>
+            </a:r>
+            <a:r>
+              <a:rPr lang="de-DE" baseline="0" dirty="0" smtClean="0"/>
+              <a:t> </a:t>
+            </a:r>
+            <a:r>
+              <a:rPr lang="de-DE" baseline="0" dirty="0" err="1" smtClean="0"/>
+              <a:t>context</a:t>
+            </a:r>
+            <a:r>
+              <a:rPr lang="de-DE" baseline="0" dirty="0" smtClean="0"/>
+              <a:t> </a:t>
+            </a:r>
+            <a:r>
+              <a:rPr lang="de-DE" baseline="0" dirty="0" err="1" smtClean="0"/>
+              <a:t>is</a:t>
+            </a:r>
+            <a:r>
+              <a:rPr lang="de-DE" baseline="0" dirty="0" smtClean="0"/>
+              <a:t> </a:t>
+            </a:r>
+            <a:r>
+              <a:rPr lang="de-DE" baseline="0" dirty="0" err="1" smtClean="0"/>
+              <a:t>evaluated</a:t>
+            </a:r>
+            <a:r>
+              <a:rPr lang="de-DE" baseline="0" dirty="0" smtClean="0"/>
+              <a:t> </a:t>
+            </a:r>
+            <a:r>
+              <a:rPr lang="de-DE" baseline="0" dirty="0" err="1" smtClean="0"/>
+              <a:t>against</a:t>
+            </a:r>
+            <a:r>
+              <a:rPr lang="de-DE" baseline="0" dirty="0" smtClean="0"/>
+              <a:t> </a:t>
+            </a:r>
+            <a:r>
+              <a:rPr lang="de-DE" baseline="0" dirty="0" err="1" smtClean="0"/>
+              <a:t>the</a:t>
+            </a:r>
+            <a:r>
+              <a:rPr lang="de-DE" baseline="0" dirty="0" smtClean="0"/>
+              <a:t> „</a:t>
+            </a:r>
+            <a:r>
+              <a:rPr lang="de-DE" baseline="0" dirty="0" err="1" smtClean="0"/>
+              <a:t>Condition</a:t>
+            </a:r>
+            <a:r>
+              <a:rPr lang="de-DE" baseline="0" dirty="0" smtClean="0"/>
+              <a:t>“ in </a:t>
+            </a:r>
+            <a:r>
+              <a:rPr lang="de-DE" baseline="0" dirty="0" err="1" smtClean="0"/>
+              <a:t>the</a:t>
+            </a:r>
+            <a:r>
+              <a:rPr lang="de-DE" baseline="0" dirty="0" smtClean="0"/>
+              <a:t> </a:t>
+            </a:r>
+            <a:r>
+              <a:rPr lang="de-DE" baseline="0" dirty="0" err="1" smtClean="0"/>
+              <a:t>given</a:t>
+            </a:r>
+            <a:r>
+              <a:rPr lang="de-DE" baseline="0" dirty="0" smtClean="0"/>
+              <a:t> </a:t>
+            </a:r>
+            <a:r>
+              <a:rPr lang="de-DE" baseline="0" dirty="0" err="1" smtClean="0"/>
+              <a:t>policy</a:t>
+            </a:r>
+            <a:r>
+              <a:rPr lang="de-DE" baseline="0" dirty="0" smtClean="0"/>
+              <a:t>.</a:t>
             </a:r>
             <a:endParaRPr lang="en-US" dirty="0"/>
           </a:p>
@@ -2193,7 +2459,7 @@
           <a:p>
             <a:fld id="{BFB43062-714D-1146-A97F-0D45BD9E7BF0}" type="slidenum">
               <a:rPr lang="en-US" smtClean="0"/>
-              <a:t>11</a:t>
+              <a:t>10</a:t>
             </a:fld>
             <a:endParaRPr lang="en-US"/>
           </a:p>
@@ -2202,7 +2468,7 @@
     </p:spTree>
     <p:extLst>
       <p:ext uri="{BB962C8B-B14F-4D97-AF65-F5344CB8AC3E}">
-        <p14:creationId xmlns:p14="http://schemas.microsoft.com/office/powerpoint/2010/main" val="2555364409"/>
+        <p14:creationId xmlns:p14="http://schemas.microsoft.com/office/powerpoint/2010/main" val="116716749"/>
       </p:ext>
     </p:extLst>
   </p:cSld>
@@ -2258,7 +2524,35 @@
           <a:p>
             <a:r>
               <a:rPr lang="en-US" dirty="0" smtClean="0"/>
-              <a:t>Reference:</a:t>
+              <a:t>Why would you use a</a:t>
+            </a:r>
+            <a:r>
+              <a:rPr lang="en-US" baseline="0" dirty="0" smtClean="0"/>
+              <a:t> Managed Policy versus an Inline Policy:</a:t>
+            </a:r>
+          </a:p>
+          <a:p>
+            <a:r>
+              <a:rPr lang="en-US" baseline="0" dirty="0" smtClean="0"/>
+              <a:t>1. If you require that a policy be utilized by multiple types of principles, use a Managed Policy. As an example, you would use an IAM Role with an application running on EC2 and you would use an IAM Policy with an application running on a </a:t>
+            </a:r>
+            <a:r>
+              <a:rPr lang="en-US" baseline="0" smtClean="0"/>
+              <a:t>Developer’s laptop.</a:t>
+            </a:r>
+            <a:endParaRPr lang="en-US" dirty="0" smtClean="0"/>
+          </a:p>
+          <a:p>
+            <a:endParaRPr lang="en-US" dirty="0" smtClean="0"/>
+          </a:p>
+          <a:p>
+            <a:r>
+              <a:rPr lang="en-US" dirty="0" smtClean="0"/>
+              <a:t>Reference</a:t>
+            </a:r>
+            <a:r>
+              <a:rPr lang="en-US" dirty="0" smtClean="0"/>
+              <a:t>:</a:t>
             </a:r>
           </a:p>
           <a:p>
@@ -2284,11 +2578,19 @@
             </a:r>
             <a:r>
               <a:rPr lang="en-US" dirty="0" smtClean="0"/>
-              <a:t>/</a:t>
+              <a:t>/policies-managed-</a:t>
             </a:r>
             <a:r>
               <a:rPr lang="en-US" dirty="0" err="1" smtClean="0"/>
-              <a:t>PolicyVariables.html</a:t>
+              <a:t>vs</a:t>
+            </a:r>
+            <a:r>
+              <a:rPr lang="en-US" dirty="0" smtClean="0"/>
+              <a:t>-</a:t>
+            </a:r>
+            <a:r>
+              <a:rPr lang="en-US" dirty="0" err="1" smtClean="0"/>
+              <a:t>inline.html</a:t>
             </a:r>
             <a:endParaRPr lang="en-US" dirty="0"/>
           </a:p>
@@ -2320,7 +2622,7 @@
     </p:spTree>
     <p:extLst>
       <p:ext uri="{BB962C8B-B14F-4D97-AF65-F5344CB8AC3E}">
-        <p14:creationId xmlns:p14="http://schemas.microsoft.com/office/powerpoint/2010/main" val="305666501"/>
+        <p14:creationId xmlns:p14="http://schemas.microsoft.com/office/powerpoint/2010/main" val="2555364409"/>
       </p:ext>
     </p:extLst>
   </p:cSld>
@@ -16884,6 +17186,398 @@
       </p:grpSpPr>
       <p:sp>
         <p:nvSpPr>
+          <p:cNvPr id="3" name="Content Placeholder 2"/>
+          <p:cNvSpPr>
+            <a:spLocks noGrp="1"/>
+          </p:cNvSpPr>
+          <p:nvPr>
+            <p:ph idx="1"/>
+          </p:nvPr>
+        </p:nvSpPr>
+        <p:spPr>
+          <a:xfrm>
+            <a:off x="872067" y="2675466"/>
+            <a:ext cx="7408333" cy="3915469"/>
+          </a:xfrm>
+        </p:spPr>
+        <p:txBody>
+          <a:bodyPr>
+            <a:normAutofit fontScale="55000" lnSpcReduction="20000"/>
+          </a:bodyPr>
+          <a:lstStyle/>
+          <a:p>
+            <a:pPr marL="0" indent="0">
+              <a:buNone/>
+            </a:pPr>
+            <a:r>
+              <a:rPr lang="en-US" dirty="0" smtClean="0">
+                <a:latin typeface="Courier"/>
+                <a:cs typeface="Courier"/>
+              </a:rPr>
+              <a:t>Command: </a:t>
+            </a:r>
+            <a:r>
+              <a:rPr lang="en-US" dirty="0" err="1" smtClean="0">
+                <a:latin typeface="Courier"/>
+                <a:cs typeface="Courier"/>
+              </a:rPr>
+              <a:t>aws</a:t>
+            </a:r>
+            <a:r>
+              <a:rPr lang="en-US" dirty="0" smtClean="0">
+                <a:latin typeface="Courier"/>
+                <a:cs typeface="Courier"/>
+              </a:rPr>
+              <a:t> </a:t>
+            </a:r>
+            <a:r>
+              <a:rPr lang="en-US" dirty="0">
+                <a:latin typeface="Courier"/>
+                <a:cs typeface="Courier"/>
+              </a:rPr>
+              <a:t>ec2 terminate-instances --instance-ids i-</a:t>
+            </a:r>
+            <a:r>
+              <a:rPr lang="en-US" dirty="0" smtClean="0">
+                <a:latin typeface="Courier"/>
+                <a:cs typeface="Courier"/>
+              </a:rPr>
+              <a:t>8f00e559</a:t>
+            </a:r>
+          </a:p>
+          <a:p>
+            <a:pPr marL="0" indent="0">
+              <a:buNone/>
+            </a:pPr>
+            <a:endParaRPr lang="en-US" dirty="0" smtClean="0">
+              <a:latin typeface="Courier"/>
+              <a:cs typeface="Courier"/>
+            </a:endParaRPr>
+          </a:p>
+          <a:p>
+            <a:pPr marL="0" indent="0">
+              <a:buNone/>
+            </a:pPr>
+            <a:r>
+              <a:rPr lang="en-US" dirty="0" smtClean="0">
+                <a:latin typeface="Courier"/>
+                <a:cs typeface="Courier"/>
+              </a:rPr>
+              <a:t>{</a:t>
+            </a:r>
+            <a:endParaRPr lang="en-US" dirty="0">
+              <a:latin typeface="Courier"/>
+              <a:cs typeface="Courier"/>
+            </a:endParaRPr>
+          </a:p>
+          <a:p>
+            <a:pPr marL="0" indent="0">
+              <a:buNone/>
+            </a:pPr>
+            <a:r>
+              <a:rPr lang="en-US" dirty="0">
+                <a:latin typeface="Courier"/>
+                <a:cs typeface="Courier"/>
+              </a:rPr>
+              <a:t>  "Statement": [</a:t>
+            </a:r>
+          </a:p>
+          <a:p>
+            <a:pPr marL="0" indent="0">
+              <a:buNone/>
+            </a:pPr>
+            <a:r>
+              <a:rPr lang="en-US" dirty="0">
+                <a:latin typeface="Courier"/>
+                <a:cs typeface="Courier"/>
+              </a:rPr>
+              <a:t>    {</a:t>
+            </a:r>
+          </a:p>
+          <a:p>
+            <a:pPr marL="0" indent="0">
+              <a:buNone/>
+            </a:pPr>
+            <a:r>
+              <a:rPr lang="en-US" dirty="0">
+                <a:latin typeface="Courier"/>
+                <a:cs typeface="Courier"/>
+              </a:rPr>
+              <a:t>      "Action": [</a:t>
+            </a:r>
+          </a:p>
+          <a:p>
+            <a:pPr marL="0" indent="0">
+              <a:buNone/>
+            </a:pPr>
+            <a:r>
+              <a:rPr lang="en-US" dirty="0" smtClean="0">
+                <a:latin typeface="Courier"/>
+                <a:cs typeface="Courier"/>
+              </a:rPr>
+              <a:t>        ”</a:t>
+            </a:r>
+            <a:r>
+              <a:rPr lang="en-US" dirty="0">
+                <a:latin typeface="Courier"/>
+                <a:cs typeface="Courier"/>
+              </a:rPr>
+              <a:t>ec2</a:t>
+            </a:r>
+            <a:r>
+              <a:rPr lang="en-US" dirty="0" smtClean="0">
+                <a:latin typeface="Courier"/>
+                <a:cs typeface="Courier"/>
+              </a:rPr>
+              <a:t>:TerminateInstance</a:t>
+            </a:r>
+            <a:r>
+              <a:rPr lang="en-US" dirty="0" smtClean="0">
+                <a:latin typeface="Courier"/>
+                <a:cs typeface="Courier"/>
+              </a:rPr>
+              <a:t>”,</a:t>
+            </a:r>
+          </a:p>
+          <a:p>
+            <a:pPr marL="0" indent="0">
+              <a:buNone/>
+            </a:pPr>
+            <a:r>
+              <a:rPr lang="en-US" dirty="0" smtClean="0">
+                <a:latin typeface="Courier"/>
+                <a:cs typeface="Courier"/>
+              </a:rPr>
+              <a:t>      ]</a:t>
+            </a:r>
+            <a:r>
+              <a:rPr lang="en-US" dirty="0">
+                <a:latin typeface="Courier"/>
+                <a:cs typeface="Courier"/>
+              </a:rPr>
+              <a:t>,</a:t>
+            </a:r>
+          </a:p>
+          <a:p>
+            <a:pPr marL="0" indent="0">
+              <a:buNone/>
+            </a:pPr>
+            <a:r>
+              <a:rPr lang="en-US" dirty="0">
+                <a:latin typeface="Courier"/>
+                <a:cs typeface="Courier"/>
+              </a:rPr>
+              <a:t>      "Effect": "Allow",</a:t>
+            </a:r>
+          </a:p>
+          <a:p>
+            <a:pPr marL="0" indent="0">
+              <a:buNone/>
+            </a:pPr>
+            <a:r>
+              <a:rPr lang="en-US" dirty="0">
+                <a:latin typeface="Courier"/>
+                <a:cs typeface="Courier"/>
+              </a:rPr>
+              <a:t>      "Resource”:["</a:t>
+            </a:r>
+            <a:r>
+              <a:rPr lang="en-US" dirty="0" smtClean="0">
+                <a:latin typeface="Courier"/>
+                <a:cs typeface="Courier"/>
+              </a:rPr>
+              <a:t>arn:aws:ec2:</a:t>
+            </a:r>
+            <a:r>
+              <a:rPr lang="en-US" dirty="0">
+                <a:latin typeface="Courier"/>
+                <a:cs typeface="Courier"/>
+              </a:rPr>
+              <a:t>:</a:t>
+            </a:r>
+            <a:r>
+              <a:rPr lang="en-US" dirty="0" smtClean="0">
+                <a:latin typeface="Courier"/>
+                <a:cs typeface="Courier"/>
+              </a:rPr>
+              <a:t>:*"</a:t>
+            </a:r>
+            <a:r>
+              <a:rPr lang="en-US" dirty="0" smtClean="0">
+                <a:latin typeface="Courier"/>
+                <a:cs typeface="Courier"/>
+              </a:rPr>
+              <a:t>]</a:t>
+            </a:r>
+          </a:p>
+          <a:p>
+            <a:pPr marL="0" indent="0">
+              <a:buNone/>
+            </a:pPr>
+            <a:r>
+              <a:rPr lang="en-US" dirty="0" smtClean="0">
+                <a:latin typeface="Courier"/>
+                <a:cs typeface="Courier"/>
+              </a:rPr>
+              <a:t>      "</a:t>
+            </a:r>
+            <a:r>
+              <a:rPr lang="en-US" dirty="0">
+                <a:latin typeface="Courier"/>
+                <a:cs typeface="Courier"/>
+              </a:rPr>
+              <a:t>Condition": {</a:t>
+            </a:r>
+          </a:p>
+          <a:p>
+            <a:pPr marL="0" indent="0">
+              <a:buNone/>
+            </a:pPr>
+            <a:r>
+              <a:rPr lang="en-US" dirty="0">
+                <a:latin typeface="Courier"/>
+                <a:cs typeface="Courier"/>
+              </a:rPr>
+              <a:t>  </a:t>
+            </a:r>
+            <a:r>
+              <a:rPr lang="en-US" dirty="0" smtClean="0">
+                <a:latin typeface="Courier"/>
+                <a:cs typeface="Courier"/>
+              </a:rPr>
+              <a:t>      "</a:t>
+            </a:r>
+            <a:r>
+              <a:rPr lang="en-US" dirty="0" err="1" smtClean="0">
+                <a:latin typeface="Courier"/>
+                <a:cs typeface="Courier"/>
+              </a:rPr>
+              <a:t>DateLessThan</a:t>
+            </a:r>
+            <a:r>
+              <a:rPr lang="en-US" dirty="0">
+                <a:latin typeface="Courier"/>
+                <a:cs typeface="Courier"/>
+              </a:rPr>
+              <a:t>" : {</a:t>
+            </a:r>
+          </a:p>
+          <a:p>
+            <a:pPr marL="0" indent="0">
+              <a:buNone/>
+            </a:pPr>
+            <a:r>
+              <a:rPr lang="en-US" dirty="0">
+                <a:latin typeface="Courier"/>
+                <a:cs typeface="Courier"/>
+              </a:rPr>
+              <a:t>     </a:t>
+            </a:r>
+            <a:r>
+              <a:rPr lang="en-US" dirty="0" smtClean="0">
+                <a:latin typeface="Courier"/>
+                <a:cs typeface="Courier"/>
+              </a:rPr>
+              <a:t>     "</a:t>
+            </a:r>
+            <a:r>
+              <a:rPr lang="en-US" dirty="0" err="1">
+                <a:latin typeface="Courier"/>
+                <a:cs typeface="Courier"/>
+              </a:rPr>
+              <a:t>aws:CurrentTime</a:t>
+            </a:r>
+            <a:r>
+              <a:rPr lang="en-US" dirty="0">
+                <a:latin typeface="Courier"/>
+                <a:cs typeface="Courier"/>
+              </a:rPr>
+              <a:t>" : "2015-05-24T20:00:</a:t>
+            </a:r>
+            <a:r>
+              <a:rPr lang="en-US" dirty="0" smtClean="0">
+                <a:latin typeface="Courier"/>
+                <a:cs typeface="Courier"/>
+              </a:rPr>
+              <a:t>00Z”</a:t>
+            </a:r>
+            <a:endParaRPr lang="en-US" dirty="0">
+              <a:latin typeface="Courier"/>
+              <a:cs typeface="Courier"/>
+            </a:endParaRPr>
+          </a:p>
+          <a:p>
+            <a:pPr marL="0" indent="0">
+              <a:buNone/>
+            </a:pPr>
+            <a:r>
+              <a:rPr lang="en-US" dirty="0" smtClean="0">
+                <a:latin typeface="Courier"/>
+                <a:cs typeface="Courier"/>
+              </a:rPr>
+              <a:t>        }</a:t>
+            </a:r>
+            <a:endParaRPr lang="en-US" dirty="0">
+              <a:latin typeface="Courier"/>
+              <a:cs typeface="Courier"/>
+            </a:endParaRPr>
+          </a:p>
+          <a:p>
+            <a:pPr marL="0" indent="0">
+              <a:buNone/>
+            </a:pPr>
+            <a:r>
+              <a:rPr lang="en-US" dirty="0" smtClean="0">
+                <a:latin typeface="Courier"/>
+                <a:cs typeface="Courier"/>
+              </a:rPr>
+              <a:t>      }</a:t>
+            </a:r>
+            <a:endParaRPr lang="en-US" dirty="0">
+              <a:latin typeface="Courier"/>
+              <a:cs typeface="Courier"/>
+            </a:endParaRPr>
+          </a:p>
+          <a:p>
+            <a:pPr marL="0" indent="0">
+              <a:buNone/>
+            </a:pPr>
+            <a:r>
+              <a:rPr lang="en-US" dirty="0">
+                <a:latin typeface="Courier"/>
+                <a:cs typeface="Courier"/>
+              </a:rPr>
+              <a:t>    }</a:t>
+            </a:r>
+          </a:p>
+          <a:p>
+            <a:pPr marL="0" indent="0">
+              <a:buNone/>
+            </a:pPr>
+            <a:r>
+              <a:rPr lang="en-US" dirty="0">
+                <a:latin typeface="Courier"/>
+                <a:cs typeface="Courier"/>
+              </a:rPr>
+              <a:t>  ]</a:t>
+            </a:r>
+          </a:p>
+          <a:p>
+            <a:pPr marL="0" indent="0">
+              <a:buNone/>
+            </a:pPr>
+            <a:r>
+              <a:rPr lang="en-US" dirty="0">
+                <a:latin typeface="Courier"/>
+                <a:cs typeface="Courier"/>
+              </a:rPr>
+              <a:t>}</a:t>
+            </a:r>
+          </a:p>
+        </p:txBody>
+      </p:sp>
+      <p:sp>
+        <p:nvSpPr>
           <p:cNvPr id="2" name="Title 1"/>
           <p:cNvSpPr>
             <a:spLocks noGrp="1"/>
@@ -16901,138 +17595,7 @@
           <a:p>
             <a:r>
               <a:rPr lang="en-US" dirty="0" smtClean="0"/>
-              <a:t>IAM: Roles and Users Compared</a:t>
-            </a:r>
-            <a:endParaRPr lang="en-US" dirty="0"/>
-          </a:p>
-        </p:txBody>
-      </p:sp>
-      <p:sp>
-        <p:nvSpPr>
-          <p:cNvPr id="5" name="Text Placeholder 4"/>
-          <p:cNvSpPr>
-            <a:spLocks noGrp="1"/>
-          </p:cNvSpPr>
-          <p:nvPr>
-            <p:ph type="body" idx="1"/>
-          </p:nvPr>
-        </p:nvSpPr>
-        <p:spPr/>
-        <p:txBody>
-          <a:bodyPr/>
-          <a:lstStyle/>
-          <a:p>
-            <a:r>
-              <a:rPr lang="en-US" dirty="0" smtClean="0"/>
-              <a:t>IAM Role</a:t>
-            </a:r>
-            <a:endParaRPr lang="en-US" dirty="0"/>
-          </a:p>
-        </p:txBody>
-      </p:sp>
-      <p:sp>
-        <p:nvSpPr>
-          <p:cNvPr id="3" name="Content Placeholder 2"/>
-          <p:cNvSpPr>
-            <a:spLocks noGrp="1"/>
-          </p:cNvSpPr>
-          <p:nvPr>
-            <p:ph sz="half" idx="2"/>
-          </p:nvPr>
-        </p:nvSpPr>
-        <p:spPr/>
-        <p:txBody>
-          <a:bodyPr>
-            <a:normAutofit lnSpcReduction="10000"/>
-          </a:bodyPr>
-          <a:lstStyle/>
-          <a:p>
-            <a:r>
-              <a:rPr lang="en-US" dirty="0" smtClean="0"/>
-              <a:t>If using AWS SDKs, it “just works”</a:t>
-            </a:r>
-          </a:p>
-          <a:p>
-            <a:r>
-              <a:rPr lang="en-US" dirty="0"/>
-              <a:t>Supported only on EC2 and AWS </a:t>
-            </a:r>
-            <a:r>
-              <a:rPr lang="en-US" dirty="0" smtClean="0"/>
-              <a:t>Resources</a:t>
-            </a:r>
-            <a:endParaRPr lang="en-US" dirty="0"/>
-          </a:p>
-          <a:p>
-            <a:r>
-              <a:rPr lang="en-US" dirty="0" smtClean="0"/>
-              <a:t>Credential rotation provided by Amazon</a:t>
-            </a:r>
-          </a:p>
-          <a:p>
-            <a:r>
-              <a:rPr lang="en-US" dirty="0" smtClean="0"/>
-              <a:t>Available via instance meta-data query</a:t>
-            </a:r>
-          </a:p>
-          <a:p>
-            <a:endParaRPr lang="en-US" dirty="0" smtClean="0"/>
-          </a:p>
-        </p:txBody>
-      </p:sp>
-      <p:sp>
-        <p:nvSpPr>
-          <p:cNvPr id="6" name="Text Placeholder 5"/>
-          <p:cNvSpPr>
-            <a:spLocks noGrp="1"/>
-          </p:cNvSpPr>
-          <p:nvPr>
-            <p:ph type="body" sz="quarter" idx="3"/>
-          </p:nvPr>
-        </p:nvSpPr>
-        <p:spPr/>
-        <p:txBody>
-          <a:bodyPr/>
-          <a:lstStyle/>
-          <a:p>
-            <a:r>
-              <a:rPr lang="en-US" dirty="0" smtClean="0"/>
-              <a:t>IAM Users</a:t>
-            </a:r>
-            <a:endParaRPr lang="en-US" dirty="0"/>
-          </a:p>
-        </p:txBody>
-      </p:sp>
-      <p:sp>
-        <p:nvSpPr>
-          <p:cNvPr id="7" name="Content Placeholder 6"/>
-          <p:cNvSpPr>
-            <a:spLocks noGrp="1"/>
-          </p:cNvSpPr>
-          <p:nvPr>
-            <p:ph sz="quarter" idx="4"/>
-          </p:nvPr>
-        </p:nvSpPr>
-        <p:spPr/>
-        <p:txBody>
-          <a:bodyPr/>
-          <a:lstStyle/>
-          <a:p>
-            <a:r>
-              <a:rPr lang="en-US" dirty="0" smtClean="0"/>
-              <a:t>Can be utilized on non-AWS Resources</a:t>
-            </a:r>
-          </a:p>
-          <a:p>
-            <a:r>
-              <a:rPr lang="en-US" dirty="0" smtClean="0"/>
-              <a:t>Permissions can be tested easily</a:t>
-            </a:r>
-          </a:p>
-          <a:p>
-            <a:r>
-              <a:rPr lang="en-US" dirty="0" smtClean="0"/>
-              <a:t>Difficult to Secure (has to be checked in / distributed securely)</a:t>
+              <a:t>IAM: Will it Terminate?</a:t>
             </a:r>
             <a:endParaRPr lang="en-US" dirty="0"/>
           </a:p>
@@ -17041,7 +17604,7 @@
     </p:spTree>
     <p:extLst>
       <p:ext uri="{BB962C8B-B14F-4D97-AF65-F5344CB8AC3E}">
-        <p14:creationId xmlns:p14="http://schemas.microsoft.com/office/powerpoint/2010/main" val="2555247866"/>
+        <p14:creationId xmlns:p14="http://schemas.microsoft.com/office/powerpoint/2010/main" val="1983193316"/>
       </p:ext>
     </p:extLst>
   </p:cSld>
@@ -17094,6 +17657,199 @@
           <a:p>
             <a:r>
               <a:rPr lang="en-US" dirty="0" smtClean="0"/>
+              <a:t>IAM: Roles and Users Compared</a:t>
+            </a:r>
+            <a:endParaRPr lang="en-US" dirty="0"/>
+          </a:p>
+        </p:txBody>
+      </p:sp>
+      <p:sp>
+        <p:nvSpPr>
+          <p:cNvPr id="5" name="Text Placeholder 4"/>
+          <p:cNvSpPr>
+            <a:spLocks noGrp="1"/>
+          </p:cNvSpPr>
+          <p:nvPr>
+            <p:ph type="body" idx="1"/>
+          </p:nvPr>
+        </p:nvSpPr>
+        <p:spPr/>
+        <p:txBody>
+          <a:bodyPr/>
+          <a:lstStyle/>
+          <a:p>
+            <a:r>
+              <a:rPr lang="en-US" dirty="0" smtClean="0"/>
+              <a:t>IAM Role</a:t>
+            </a:r>
+            <a:endParaRPr lang="en-US" dirty="0"/>
+          </a:p>
+        </p:txBody>
+      </p:sp>
+      <p:sp>
+        <p:nvSpPr>
+          <p:cNvPr id="3" name="Content Placeholder 2"/>
+          <p:cNvSpPr>
+            <a:spLocks noGrp="1"/>
+          </p:cNvSpPr>
+          <p:nvPr>
+            <p:ph sz="half" idx="2"/>
+          </p:nvPr>
+        </p:nvSpPr>
+        <p:spPr/>
+        <p:txBody>
+          <a:bodyPr>
+            <a:normAutofit lnSpcReduction="10000"/>
+          </a:bodyPr>
+          <a:lstStyle/>
+          <a:p>
+            <a:r>
+              <a:rPr lang="en-US" dirty="0" smtClean="0"/>
+              <a:t>If using AWS SDKs, it “just works”</a:t>
+            </a:r>
+          </a:p>
+          <a:p>
+            <a:r>
+              <a:rPr lang="en-US" dirty="0"/>
+              <a:t>Supported only on EC2 and AWS </a:t>
+            </a:r>
+            <a:r>
+              <a:rPr lang="en-US" dirty="0" smtClean="0"/>
+              <a:t>Resources</a:t>
+            </a:r>
+            <a:endParaRPr lang="en-US" dirty="0"/>
+          </a:p>
+          <a:p>
+            <a:r>
+              <a:rPr lang="en-US" dirty="0" smtClean="0"/>
+              <a:t>Credential rotation provided by Amazon</a:t>
+            </a:r>
+          </a:p>
+          <a:p>
+            <a:r>
+              <a:rPr lang="en-US" dirty="0" smtClean="0"/>
+              <a:t>Available via instance meta-data query</a:t>
+            </a:r>
+          </a:p>
+          <a:p>
+            <a:endParaRPr lang="en-US" dirty="0" smtClean="0"/>
+          </a:p>
+        </p:txBody>
+      </p:sp>
+      <p:sp>
+        <p:nvSpPr>
+          <p:cNvPr id="6" name="Text Placeholder 5"/>
+          <p:cNvSpPr>
+            <a:spLocks noGrp="1"/>
+          </p:cNvSpPr>
+          <p:nvPr>
+            <p:ph type="body" sz="quarter" idx="3"/>
+          </p:nvPr>
+        </p:nvSpPr>
+        <p:spPr/>
+        <p:txBody>
+          <a:bodyPr/>
+          <a:lstStyle/>
+          <a:p>
+            <a:r>
+              <a:rPr lang="en-US" dirty="0" smtClean="0"/>
+              <a:t>IAM Users</a:t>
+            </a:r>
+            <a:endParaRPr lang="en-US" dirty="0"/>
+          </a:p>
+        </p:txBody>
+      </p:sp>
+      <p:sp>
+        <p:nvSpPr>
+          <p:cNvPr id="7" name="Content Placeholder 6"/>
+          <p:cNvSpPr>
+            <a:spLocks noGrp="1"/>
+          </p:cNvSpPr>
+          <p:nvPr>
+            <p:ph sz="quarter" idx="4"/>
+          </p:nvPr>
+        </p:nvSpPr>
+        <p:spPr/>
+        <p:txBody>
+          <a:bodyPr/>
+          <a:lstStyle/>
+          <a:p>
+            <a:r>
+              <a:rPr lang="en-US" dirty="0" smtClean="0"/>
+              <a:t>Can be utilized on non-AWS Resources</a:t>
+            </a:r>
+          </a:p>
+          <a:p>
+            <a:r>
+              <a:rPr lang="en-US" dirty="0" smtClean="0"/>
+              <a:t>Permissions can be tested easily</a:t>
+            </a:r>
+          </a:p>
+          <a:p>
+            <a:r>
+              <a:rPr lang="en-US" dirty="0" smtClean="0"/>
+              <a:t>Difficult to Secure (has to be checked in / distributed securely)</a:t>
+            </a:r>
+            <a:endParaRPr lang="en-US" dirty="0"/>
+          </a:p>
+        </p:txBody>
+      </p:sp>
+    </p:spTree>
+    <p:extLst>
+      <p:ext uri="{BB962C8B-B14F-4D97-AF65-F5344CB8AC3E}">
+        <p14:creationId xmlns:p14="http://schemas.microsoft.com/office/powerpoint/2010/main" val="2555247866"/>
+      </p:ext>
+    </p:extLst>
+  </p:cSld>
+  <p:clrMapOvr>
+    <a:masterClrMapping/>
+  </p:clrMapOvr>
+  <p:timing>
+    <p:tnLst>
+      <p:par>
+        <p:cTn xmlns:p14="http://schemas.microsoft.com/office/powerpoint/2010/main" id="1" dur="indefinite" restart="never" nodeType="tmRoot"/>
+      </p:par>
+    </p:tnLst>
+  </p:timing>
+</p:sld>
+</file>
+
+<file path=ppt/slides/slide12.xml><?xml version="1.0" encoding="utf-8"?>
+<p:sld xmlns:a="http://schemas.openxmlformats.org/drawingml/2006/main" xmlns:r="http://schemas.openxmlformats.org/officeDocument/2006/relationships" xmlns:p="http://schemas.openxmlformats.org/presentationml/2006/main">
+  <p:cSld>
+    <p:spTree>
+      <p:nvGrpSpPr>
+        <p:cNvPr id="1" name=""/>
+        <p:cNvGrpSpPr/>
+        <p:nvPr/>
+      </p:nvGrpSpPr>
+      <p:grpSpPr>
+        <a:xfrm>
+          <a:off x="0" y="0"/>
+          <a:ext cx="0" cy="0"/>
+          <a:chOff x="0" y="0"/>
+          <a:chExt cx="0" cy="0"/>
+        </a:xfrm>
+      </p:grpSpPr>
+      <p:sp>
+        <p:nvSpPr>
+          <p:cNvPr id="2" name="Title 1"/>
+          <p:cNvSpPr>
+            <a:spLocks noGrp="1"/>
+          </p:cNvSpPr>
+          <p:nvPr>
+            <p:ph type="title"/>
+          </p:nvPr>
+        </p:nvSpPr>
+        <p:spPr/>
+        <p:txBody>
+          <a:bodyPr>
+            <a:normAutofit/>
+          </a:bodyPr>
+          <a:lstStyle/>
+          <a:p>
+            <a:r>
+              <a:rPr lang="en-US" dirty="0" smtClean="0"/>
               <a:t>IAM: Managed vs. Inline Policies</a:t>
             </a:r>
             <a:endParaRPr lang="en-US" dirty="0"/>
@@ -17220,7 +17976,7 @@
 </p:sld>
 </file>
 
-<file path=ppt/slides/slide12.xml><?xml version="1.0" encoding="utf-8"?>
+<file path=ppt/slides/slide13.xml><?xml version="1.0" encoding="utf-8"?>
 <p:sld xmlns:a="http://schemas.openxmlformats.org/drawingml/2006/main" xmlns:r="http://schemas.openxmlformats.org/officeDocument/2006/relationships" xmlns:p="http://schemas.openxmlformats.org/presentationml/2006/main">
   <p:cSld>
     <p:spTree>
@@ -17569,7 +18325,7 @@
 </p:sld>
 </file>
 
-<file path=ppt/slides/slide13.xml><?xml version="1.0" encoding="utf-8"?>
+<file path=ppt/slides/slide14.xml><?xml version="1.0" encoding="utf-8"?>
 <p:sld xmlns:a="http://schemas.openxmlformats.org/drawingml/2006/main" xmlns:r="http://schemas.openxmlformats.org/officeDocument/2006/relationships" xmlns:p="http://schemas.openxmlformats.org/presentationml/2006/main">
   <p:cSld>
     <p:spTree>
@@ -18023,133 +18779,6 @@
   <p:clrMapOvr>
     <a:masterClrMapping/>
   </p:clrMapOvr>
-</p:sld>
-</file>
-
-<file path=ppt/slides/slide14.xml><?xml version="1.0" encoding="utf-8"?>
-<p:sld xmlns:a="http://schemas.openxmlformats.org/drawingml/2006/main" xmlns:r="http://schemas.openxmlformats.org/officeDocument/2006/relationships" xmlns:p="http://schemas.openxmlformats.org/presentationml/2006/main">
-  <p:cSld>
-    <p:spTree>
-      <p:nvGrpSpPr>
-        <p:cNvPr id="1" name=""/>
-        <p:cNvGrpSpPr/>
-        <p:nvPr/>
-      </p:nvGrpSpPr>
-      <p:grpSpPr>
-        <a:xfrm>
-          <a:off x="0" y="0"/>
-          <a:ext cx="0" cy="0"/>
-          <a:chOff x="0" y="0"/>
-          <a:chExt cx="0" cy="0"/>
-        </a:xfrm>
-      </p:grpSpPr>
-      <p:sp>
-        <p:nvSpPr>
-          <p:cNvPr id="3" name="Content Placeholder 2"/>
-          <p:cNvSpPr>
-            <a:spLocks noGrp="1"/>
-          </p:cNvSpPr>
-          <p:nvPr>
-            <p:ph idx="1"/>
-          </p:nvPr>
-        </p:nvSpPr>
-        <p:spPr/>
-        <p:txBody>
-          <a:bodyPr>
-            <a:normAutofit/>
-          </a:bodyPr>
-          <a:lstStyle/>
-          <a:p>
-            <a:r>
-              <a:rPr lang="en-US" dirty="0" smtClean="0"/>
-              <a:t>Allows API calls to be made from an Application on EC2</a:t>
-            </a:r>
-          </a:p>
-          <a:p>
-            <a:r>
-              <a:rPr lang="en-US" dirty="0" smtClean="0"/>
-              <a:t>Access Key and Secret Key available </a:t>
-            </a:r>
-            <a:r>
-              <a:rPr lang="en-US" dirty="0"/>
-              <a:t>at URL curl http://169.254.169.254/latest/meta-data/</a:t>
-            </a:r>
-            <a:r>
-              <a:rPr lang="en-US" dirty="0" err="1"/>
-              <a:t>iam</a:t>
-            </a:r>
-            <a:r>
-              <a:rPr lang="en-US" dirty="0"/>
-              <a:t>/security-credentials/</a:t>
-            </a:r>
-            <a:r>
-              <a:rPr lang="en-US" dirty="0" err="1"/>
-              <a:t>role_name</a:t>
-            </a:r>
-            <a:endParaRPr lang="en-US" dirty="0" smtClean="0"/>
-          </a:p>
-          <a:p>
-            <a:r>
-              <a:rPr lang="en-US" dirty="0" smtClean="0"/>
-              <a:t>Official AWS SDKs can retrieve this Access Key and Secret Key for you – it “just works”</a:t>
-            </a:r>
-          </a:p>
-          <a:p>
-            <a:r>
-              <a:rPr lang="en-US" dirty="0" smtClean="0"/>
-              <a:t>Credentials rotated Automatically</a:t>
-            </a:r>
-          </a:p>
-          <a:p>
-            <a:endParaRPr lang="en-US" dirty="0" smtClean="0"/>
-          </a:p>
-          <a:p>
-            <a:endParaRPr lang="en-US" dirty="0" smtClean="0"/>
-          </a:p>
-        </p:txBody>
-      </p:sp>
-      <p:sp>
-        <p:nvSpPr>
-          <p:cNvPr id="2" name="Title 1"/>
-          <p:cNvSpPr>
-            <a:spLocks noGrp="1"/>
-          </p:cNvSpPr>
-          <p:nvPr>
-            <p:ph type="title"/>
-          </p:nvPr>
-        </p:nvSpPr>
-        <p:spPr/>
-        <p:txBody>
-          <a:bodyPr>
-            <a:normAutofit/>
-          </a:bodyPr>
-          <a:lstStyle/>
-          <a:p>
-            <a:r>
-              <a:rPr lang="en-US" dirty="0" smtClean="0"/>
-              <a:t>IAM: IAM Roles for EC2</a:t>
-            </a:r>
-            <a:endParaRPr lang="en-US" dirty="0"/>
-          </a:p>
-        </p:txBody>
-      </p:sp>
-    </p:spTree>
-    <p:extLst>
-      <p:ext uri="{BB962C8B-B14F-4D97-AF65-F5344CB8AC3E}">
-        <p14:creationId xmlns:p14="http://schemas.microsoft.com/office/powerpoint/2010/main" val="4122533754"/>
-      </p:ext>
-    </p:extLst>
-  </p:cSld>
-  <p:clrMapOvr>
-    <a:masterClrMapping/>
-  </p:clrMapOvr>
-  <p:timing>
-    <p:tnLst>
-      <p:par>
-        <p:cTn xmlns:p14="http://schemas.microsoft.com/office/powerpoint/2010/main" id="1" dur="indefinite" restart="never" nodeType="tmRoot"/>
-      </p:par>
-    </p:tnLst>
-  </p:timing>
 </p:sld>
 </file>
 
@@ -18189,36 +18818,49 @@
           <a:p>
             <a:r>
               <a:rPr lang="en-US" dirty="0" smtClean="0"/>
-              <a:t>Use IAM instead of Root Account</a:t>
+              <a:t>Allows API calls to be made from an Application on EC2</a:t>
             </a:r>
           </a:p>
           <a:p>
             <a:r>
               <a:rPr lang="en-US" dirty="0" smtClean="0"/>
-              <a:t>Use IAM groups</a:t>
-            </a:r>
-          </a:p>
-          <a:p>
+              <a:t>Access Key and Secret Key available </a:t>
+            </a:r>
             <a:r>
               <a:rPr lang="en-US" dirty="0"/>
-              <a:t>Use Multi-Factor </a:t>
-            </a:r>
+              <a:t>at URL curl http://169.254.169.254/latest/meta-data/</a:t>
+            </a:r>
+            <a:r>
+              <a:rPr lang="en-US" dirty="0" err="1"/>
+              <a:t>iam</a:t>
+            </a:r>
+            <a:r>
+              <a:rPr lang="en-US" dirty="0"/>
+              <a:t>/security-credentials/</a:t>
+            </a:r>
+            <a:r>
+              <a:rPr lang="en-US" dirty="0" err="1"/>
+              <a:t>role_name</a:t>
+            </a:r>
+            <a:endParaRPr lang="en-US" dirty="0" smtClean="0"/>
+          </a:p>
+          <a:p>
             <a:r>
               <a:rPr lang="en-US" dirty="0" smtClean="0"/>
-              <a:t>Authentication if Possible</a:t>
+              <a:t>Official AWS SDKs can retrieve this Access Key and Secret Key for you – it “just works”</a:t>
             </a:r>
           </a:p>
           <a:p>
             <a:r>
               <a:rPr lang="en-US" dirty="0" smtClean="0"/>
-              <a:t>Provide IAM password reset sparingly</a:t>
-            </a:r>
-          </a:p>
-          <a:p>
-            <a:r>
-              <a:rPr lang="en-US" dirty="0" smtClean="0"/>
-              <a:t>Use “Least Privilege Principle” if Organization Allows</a:t>
-            </a:r>
+              <a:t>Credentials rotated Automatically</a:t>
+            </a:r>
+          </a:p>
+          <a:p>
+            <a:endParaRPr lang="en-US" dirty="0" smtClean="0"/>
+          </a:p>
+          <a:p>
+            <a:endParaRPr lang="en-US" dirty="0" smtClean="0"/>
           </a:p>
         </p:txBody>
       </p:sp>
@@ -18241,7 +18883,7 @@
           <a:p>
             <a:r>
               <a:rPr lang="en-US" dirty="0" smtClean="0"/>
-              <a:t>IAM: Best Practices</a:t>
+              <a:t>IAM: IAM Roles for EC2</a:t>
             </a:r>
             <a:endParaRPr lang="en-US" dirty="0"/>
           </a:p>
@@ -18250,7 +18892,7 @@
     </p:spTree>
     <p:extLst>
       <p:ext uri="{BB962C8B-B14F-4D97-AF65-F5344CB8AC3E}">
-        <p14:creationId xmlns:p14="http://schemas.microsoft.com/office/powerpoint/2010/main" val="2424893038"/>
+        <p14:creationId xmlns:p14="http://schemas.microsoft.com/office/powerpoint/2010/main" val="4122533754"/>
       </p:ext>
     </p:extLst>
   </p:cSld>
@@ -18297,6 +18939,120 @@
         <p:spPr/>
         <p:txBody>
           <a:bodyPr>
+            <a:normAutofit/>
+          </a:bodyPr>
+          <a:lstStyle/>
+          <a:p>
+            <a:r>
+              <a:rPr lang="en-US" dirty="0" smtClean="0"/>
+              <a:t>Use IAM instead of Root Account</a:t>
+            </a:r>
+          </a:p>
+          <a:p>
+            <a:r>
+              <a:rPr lang="en-US" dirty="0" smtClean="0"/>
+              <a:t>Use IAM groups</a:t>
+            </a:r>
+          </a:p>
+          <a:p>
+            <a:r>
+              <a:rPr lang="en-US" dirty="0"/>
+              <a:t>Use Multi-Factor </a:t>
+            </a:r>
+            <a:r>
+              <a:rPr lang="en-US" dirty="0" smtClean="0"/>
+              <a:t>Authentication if Possible</a:t>
+            </a:r>
+          </a:p>
+          <a:p>
+            <a:r>
+              <a:rPr lang="en-US" dirty="0" smtClean="0"/>
+              <a:t>Provide IAM password reset sparingly</a:t>
+            </a:r>
+          </a:p>
+          <a:p>
+            <a:r>
+              <a:rPr lang="en-US" dirty="0" smtClean="0"/>
+              <a:t>Use “Least Privilege Principle” if Organization Allows</a:t>
+            </a:r>
+          </a:p>
+        </p:txBody>
+      </p:sp>
+      <p:sp>
+        <p:nvSpPr>
+          <p:cNvPr id="2" name="Title 1"/>
+          <p:cNvSpPr>
+            <a:spLocks noGrp="1"/>
+          </p:cNvSpPr>
+          <p:nvPr>
+            <p:ph type="title"/>
+          </p:nvPr>
+        </p:nvSpPr>
+        <p:spPr/>
+        <p:txBody>
+          <a:bodyPr>
+            <a:normAutofit/>
+          </a:bodyPr>
+          <a:lstStyle/>
+          <a:p>
+            <a:r>
+              <a:rPr lang="en-US" dirty="0" smtClean="0"/>
+              <a:t>IAM: Best Practices</a:t>
+            </a:r>
+            <a:endParaRPr lang="en-US" dirty="0"/>
+          </a:p>
+        </p:txBody>
+      </p:sp>
+    </p:spTree>
+    <p:extLst>
+      <p:ext uri="{BB962C8B-B14F-4D97-AF65-F5344CB8AC3E}">
+        <p14:creationId xmlns:p14="http://schemas.microsoft.com/office/powerpoint/2010/main" val="2424893038"/>
+      </p:ext>
+    </p:extLst>
+  </p:cSld>
+  <p:clrMapOvr>
+    <a:masterClrMapping/>
+  </p:clrMapOvr>
+  <p:timing>
+    <p:tnLst>
+      <p:par>
+        <p:cTn xmlns:p14="http://schemas.microsoft.com/office/powerpoint/2010/main" id="1" dur="indefinite" restart="never" nodeType="tmRoot"/>
+      </p:par>
+    </p:tnLst>
+  </p:timing>
+</p:sld>
+</file>
+
+<file path=ppt/slides/slide17.xml><?xml version="1.0" encoding="utf-8"?>
+<p:sld xmlns:a="http://schemas.openxmlformats.org/drawingml/2006/main" xmlns:r="http://schemas.openxmlformats.org/officeDocument/2006/relationships" xmlns:p="http://schemas.openxmlformats.org/presentationml/2006/main">
+  <p:cSld>
+    <p:spTree>
+      <p:nvGrpSpPr>
+        <p:cNvPr id="1" name=""/>
+        <p:cNvGrpSpPr/>
+        <p:nvPr/>
+      </p:nvGrpSpPr>
+      <p:grpSpPr>
+        <a:xfrm>
+          <a:off x="0" y="0"/>
+          <a:ext cx="0" cy="0"/>
+          <a:chOff x="0" y="0"/>
+          <a:chExt cx="0" cy="0"/>
+        </a:xfrm>
+      </p:grpSpPr>
+      <p:sp>
+        <p:nvSpPr>
+          <p:cNvPr id="3" name="Content Placeholder 2"/>
+          <p:cNvSpPr>
+            <a:spLocks noGrp="1"/>
+          </p:cNvSpPr>
+          <p:nvPr>
+            <p:ph idx="1"/>
+          </p:nvPr>
+        </p:nvSpPr>
+        <p:spPr/>
+        <p:txBody>
+          <a:bodyPr>
             <a:normAutofit lnSpcReduction="10000"/>
           </a:bodyPr>
           <a:lstStyle/>
@@ -18397,7 +19153,7 @@
 </p:sld>
 </file>
 
-<file path=ppt/slides/slide17.xml><?xml version="1.0" encoding="utf-8"?>
+<file path=ppt/slides/slide18.xml><?xml version="1.0" encoding="utf-8"?>
 <p:sld xmlns:a="http://schemas.openxmlformats.org/drawingml/2006/main" xmlns:r="http://schemas.openxmlformats.org/officeDocument/2006/relationships" xmlns:p="http://schemas.openxmlformats.org/presentationml/2006/main">
   <p:cSld>
     <p:spTree>
@@ -18606,13 +19362,21 @@
           <a:p>
             <a:r>
               <a:rPr lang="en-US" dirty="0" smtClean="0"/>
-              <a:t>IAM identities are global in scope – one resource for an AWS account</a:t>
-            </a:r>
-          </a:p>
-          <a:p>
+              <a:t>IAM identities are </a:t>
+            </a:r>
             <a:r>
               <a:rPr lang="en-US" dirty="0" smtClean="0"/>
-              <a:t>Granularity: provides ability to control action on a particular resource type or even a particular resource</a:t>
+              <a:t>account-wide</a:t>
+            </a:r>
+          </a:p>
+          <a:p>
+            <a:r>
+              <a:rPr lang="en-US" dirty="0" smtClean="0"/>
+              <a:t>Granularity</a:t>
+            </a:r>
+            <a:r>
+              <a:rPr lang="en-US" dirty="0" smtClean="0"/>
+              <a:t>: provides ability to control action on a particular resource type or even a particular resource</a:t>
             </a:r>
             <a:endParaRPr lang="en-US" dirty="0"/>
           </a:p>
@@ -18760,7 +19524,7 @@
         <p:spPr/>
         <p:txBody>
           <a:bodyPr>
-            <a:normAutofit fontScale="92500"/>
+            <a:normAutofit lnSpcReduction="10000"/>
           </a:bodyPr>
           <a:lstStyle/>
           <a:p>
@@ -18782,12 +19546,9 @@
             </a:r>
           </a:p>
           <a:p>
-            <a:r>
-              <a:rPr lang="en-US" dirty="0"/>
-              <a:t>Federated access challenging</a:t>
-            </a:r>
-          </a:p>
-          <a:p>
+            <a:pPr marL="0" indent="0">
+              <a:buNone/>
+            </a:pPr>
             <a:endParaRPr lang="en-US" dirty="0"/>
           </a:p>
         </p:txBody>

</xml_diff>

<commit_message>
move aws iam into aws iam labs
</commit_message>
<xml_diff>
--- a/aws-iam/aws-iam.pptx
+++ b/aws-iam/aws-iam.pptx
@@ -5,7 +5,7 @@
     <p:sldMasterId id="2147483677" r:id="rId1"/>
   </p:sldMasterIdLst>
   <p:notesMasterIdLst>
-    <p:notesMasterId r:id="rId19"/>
+    <p:notesMasterId r:id="rId18"/>
   </p:notesMasterIdLst>
   <p:sldIdLst>
     <p:sldId id="256" r:id="rId2"/>
@@ -24,7 +24,6 @@
     <p:sldId id="279" r:id="rId15"/>
     <p:sldId id="277" r:id="rId16"/>
     <p:sldId id="287" r:id="rId17"/>
-    <p:sldId id="258" r:id="rId18"/>
   </p:sldIdLst>
   <p:sldSz cx="9144000" cy="6858000" type="screen4x3"/>
   <p:notesSz cx="6858000" cy="9144000"/>
@@ -224,7 +223,7 @@
           <a:p>
             <a:fld id="{1B6676A5-1300-B945-98B1-DD92DDC3A3CB}" type="datetimeFigureOut">
               <a:rPr lang="en-US" smtClean="0"/>
-              <a:t>11/22/15</a:t>
+              <a:t>12/1/15</a:t>
             </a:fld>
             <a:endParaRPr lang="en-US"/>
           </a:p>
@@ -1098,146 +1097,6 @@
 </p:notes>
 </file>
 
-<file path=ppt/notesSlides/notesSlide14.xml><?xml version="1.0" encoding="utf-8"?>
-<p:notes xmlns:a="http://schemas.openxmlformats.org/drawingml/2006/main" xmlns:r="http://schemas.openxmlformats.org/officeDocument/2006/relationships" xmlns:p="http://schemas.openxmlformats.org/presentationml/2006/main">
-  <p:cSld>
-    <p:spTree>
-      <p:nvGrpSpPr>
-        <p:cNvPr id="1" name=""/>
-        <p:cNvGrpSpPr/>
-        <p:nvPr/>
-      </p:nvGrpSpPr>
-      <p:grpSpPr>
-        <a:xfrm>
-          <a:off x="0" y="0"/>
-          <a:ext cx="0" cy="0"/>
-          <a:chOff x="0" y="0"/>
-          <a:chExt cx="0" cy="0"/>
-        </a:xfrm>
-      </p:grpSpPr>
-      <p:sp>
-        <p:nvSpPr>
-          <p:cNvPr id="2" name="Slide Image Placeholder 1"/>
-          <p:cNvSpPr>
-            <a:spLocks noGrp="1" noRot="1" noChangeAspect="1"/>
-          </p:cNvSpPr>
-          <p:nvPr>
-            <p:ph type="sldImg"/>
-          </p:nvPr>
-        </p:nvSpPr>
-        <p:spPr/>
-      </p:sp>
-      <p:sp>
-        <p:nvSpPr>
-          <p:cNvPr id="3" name="Notes Placeholder 2"/>
-          <p:cNvSpPr>
-            <a:spLocks noGrp="1"/>
-          </p:cNvSpPr>
-          <p:nvPr>
-            <p:ph type="body" idx="1"/>
-          </p:nvPr>
-        </p:nvSpPr>
-        <p:spPr/>
-        <p:txBody>
-          <a:bodyPr/>
-          <a:lstStyle/>
-          <a:p>
-            <a:r>
-              <a:rPr lang="en-US" dirty="0" smtClean="0"/>
-              <a:t>Hands</a:t>
-            </a:r>
-            <a:r>
-              <a:rPr lang="en-US" baseline="0" dirty="0" smtClean="0"/>
-              <a:t> On Files</a:t>
-            </a:r>
-            <a:r>
-              <a:rPr lang="en-US" dirty="0" smtClean="0"/>
-              <a:t>:</a:t>
-            </a:r>
-          </a:p>
-          <a:p>
-            <a:pPr marL="171450" indent="-171450">
-              <a:buFont typeface="Arial"/>
-              <a:buChar char="•"/>
-            </a:pPr>
-            <a:r>
-              <a:rPr lang="en-US" dirty="0" err="1" smtClean="0"/>
-              <a:t>iam</a:t>
-            </a:r>
-            <a:r>
-              <a:rPr lang="en-US" dirty="0" smtClean="0"/>
-              <a:t>-create-group-</a:t>
-            </a:r>
-            <a:r>
-              <a:rPr lang="en-US" dirty="0" err="1" smtClean="0"/>
-              <a:t>user.docx</a:t>
-            </a:r>
-            <a:endParaRPr lang="en-US" dirty="0" smtClean="0"/>
-          </a:p>
-          <a:p>
-            <a:pPr marL="171450" indent="-171450">
-              <a:buFont typeface="Arial"/>
-              <a:buChar char="•"/>
-            </a:pPr>
-            <a:r>
-              <a:rPr lang="en-US" dirty="0" err="1" smtClean="0"/>
-              <a:t>iam</a:t>
-            </a:r>
-            <a:r>
-              <a:rPr lang="en-US" dirty="0" smtClean="0"/>
-              <a:t>-restrict-access-</a:t>
-            </a:r>
-            <a:r>
-              <a:rPr lang="en-US" dirty="0" err="1" smtClean="0"/>
-              <a:t>tag.md</a:t>
-            </a:r>
-            <a:endParaRPr lang="en-US" smtClean="0"/>
-          </a:p>
-          <a:p>
-            <a:pPr marL="0" indent="0">
-              <a:buFont typeface="Arial"/>
-              <a:buNone/>
-            </a:pPr>
-            <a:endParaRPr lang="en-US" dirty="0"/>
-          </a:p>
-        </p:txBody>
-      </p:sp>
-      <p:sp>
-        <p:nvSpPr>
-          <p:cNvPr id="4" name="Slide Number Placeholder 3"/>
-          <p:cNvSpPr>
-            <a:spLocks noGrp="1"/>
-          </p:cNvSpPr>
-          <p:nvPr>
-            <p:ph type="sldNum" sz="quarter" idx="10"/>
-          </p:nvPr>
-        </p:nvSpPr>
-        <p:spPr/>
-        <p:txBody>
-          <a:bodyPr/>
-          <a:lstStyle/>
-          <a:p>
-            <a:fld id="{BFB43062-714D-1146-A97F-0D45BD9E7BF0}" type="slidenum">
-              <a:rPr lang="en-US" smtClean="0"/>
-              <a:t>17</a:t>
-            </a:fld>
-            <a:endParaRPr lang="en-US"/>
-          </a:p>
-        </p:txBody>
-      </p:sp>
-    </p:spTree>
-    <p:extLst>
-      <p:ext uri="{BB962C8B-B14F-4D97-AF65-F5344CB8AC3E}">
-        <p14:creationId xmlns:p14="http://schemas.microsoft.com/office/powerpoint/2010/main" val="1326461569"/>
-      </p:ext>
-    </p:extLst>
-  </p:cSld>
-  <p:clrMapOvr>
-    <a:masterClrMapping/>
-  </p:clrMapOvr>
-</p:notes>
-</file>
-
 <file path=ppt/notesSlides/notesSlide2.xml><?xml version="1.0" encoding="utf-8"?>
 <p:notes xmlns:a="http://schemas.openxmlformats.org/drawingml/2006/main" xmlns:r="http://schemas.openxmlformats.org/officeDocument/2006/relationships" xmlns:p="http://schemas.openxmlformats.org/presentationml/2006/main">
   <p:cSld>
@@ -4317,7 +4176,7 @@
           <a:p>
             <a:fld id="{7CE38E4D-051A-41E1-86A4-E56916468FD0}" type="datetimeFigureOut">
               <a:rPr lang="en-US" smtClean="0"/>
-              <a:t>11/22/15</a:t>
+              <a:t>12/1/15</a:t>
             </a:fld>
             <a:endParaRPr lang="en-US"/>
           </a:p>
@@ -4498,7 +4357,7 @@
           <a:p>
             <a:fld id="{7CE38E4D-051A-41E1-86A4-E56916468FD0}" type="datetimeFigureOut">
               <a:rPr lang="en-US" smtClean="0"/>
-              <a:t>11/22/15</a:t>
+              <a:t>12/1/15</a:t>
             </a:fld>
             <a:endParaRPr lang="en-US"/>
           </a:p>
@@ -4649,7 +4508,7 @@
           <a:p>
             <a:fld id="{7CE38E4D-051A-41E1-86A4-E56916468FD0}" type="datetimeFigureOut">
               <a:rPr lang="en-US" smtClean="0"/>
-              <a:t>11/22/15</a:t>
+              <a:t>12/1/15</a:t>
             </a:fld>
             <a:endParaRPr lang="en-US"/>
           </a:p>
@@ -6475,7 +6334,7 @@
           <a:p>
             <a:fld id="{7CE38E4D-051A-41E1-86A4-E56916468FD0}" type="datetimeFigureOut">
               <a:rPr lang="en-US" smtClean="0"/>
-              <a:t>11/22/15</a:t>
+              <a:t>12/1/15</a:t>
             </a:fld>
             <a:endParaRPr lang="en-US"/>
           </a:p>
@@ -8345,7 +8204,7 @@
           <a:p>
             <a:fld id="{7CE38E4D-051A-41E1-86A4-E56916468FD0}" type="datetimeFigureOut">
               <a:rPr lang="en-US" smtClean="0"/>
-              <a:t>11/22/15</a:t>
+              <a:t>12/1/15</a:t>
             </a:fld>
             <a:endParaRPr lang="en-US"/>
           </a:p>
@@ -8458,7 +8317,7 @@
           <a:p>
             <a:fld id="{7CE38E4D-051A-41E1-86A4-E56916468FD0}" type="datetimeFigureOut">
               <a:rPr lang="en-US" smtClean="0"/>
-              <a:t>11/22/15</a:t>
+              <a:t>12/1/15</a:t>
             </a:fld>
             <a:endParaRPr lang="en-US"/>
           </a:p>
@@ -8999,7 +8858,7 @@
           <a:p>
             <a:fld id="{7CE38E4D-051A-41E1-86A4-E56916468FD0}" type="datetimeFigureOut">
               <a:rPr lang="en-US" smtClean="0"/>
-              <a:t>11/22/15</a:t>
+              <a:t>12/1/15</a:t>
             </a:fld>
             <a:endParaRPr lang="en-US"/>
           </a:p>
@@ -9112,7 +8971,7 @@
           <a:p>
             <a:fld id="{7CE38E4D-051A-41E1-86A4-E56916468FD0}" type="datetimeFigureOut">
               <a:rPr lang="en-US" smtClean="0"/>
-              <a:t>11/22/15</a:t>
+              <a:t>12/1/15</a:t>
             </a:fld>
             <a:endParaRPr lang="en-US"/>
           </a:p>
@@ -10823,7 +10682,7 @@
           <a:p>
             <a:fld id="{7CE38E4D-051A-41E1-86A4-E56916468FD0}" type="datetimeFigureOut">
               <a:rPr lang="en-US" smtClean="0"/>
-              <a:t>11/22/15</a:t>
+              <a:t>12/1/15</a:t>
             </a:fld>
             <a:endParaRPr lang="en-US"/>
           </a:p>
@@ -10974,7 +10833,7 @@
           <a:p>
             <a:fld id="{7CE38E4D-051A-41E1-86A4-E56916468FD0}" type="datetimeFigureOut">
               <a:rPr lang="en-US" smtClean="0"/>
-              <a:t>11/22/15</a:t>
+              <a:t>12/1/15</a:t>
             </a:fld>
             <a:endParaRPr lang="en-US"/>
           </a:p>
@@ -14589,7 +14448,7 @@
           <a:p>
             <a:fld id="{7CE38E4D-051A-41E1-86A4-E56916468FD0}" type="datetimeFigureOut">
               <a:rPr lang="en-US" smtClean="0"/>
-              <a:t>11/22/15</a:t>
+              <a:t>12/1/15</a:t>
             </a:fld>
             <a:endParaRPr lang="en-US"/>
           </a:p>
@@ -16448,7 +16307,7 @@
           <a:p>
             <a:fld id="{7CE38E4D-051A-41E1-86A4-E56916468FD0}" type="datetimeFigureOut">
               <a:rPr lang="en-US" smtClean="0"/>
-              <a:t>11/22/15</a:t>
+              <a:t>12/1/15</a:t>
             </a:fld>
             <a:endParaRPr lang="en-US"/>
           </a:p>
@@ -18556,146 +18415,6 @@
     <p:extLst>
       <p:ext uri="{BB962C8B-B14F-4D97-AF65-F5344CB8AC3E}">
         <p14:creationId xmlns:p14="http://schemas.microsoft.com/office/powerpoint/2010/main" val="3708169065"/>
-      </p:ext>
-    </p:extLst>
-  </p:cSld>
-  <p:clrMapOvr>
-    <a:masterClrMapping/>
-  </p:clrMapOvr>
-  <p:timing>
-    <p:tnLst>
-      <p:par>
-        <p:cTn id="1" dur="indefinite" restart="never" nodeType="tmRoot"/>
-      </p:par>
-    </p:tnLst>
-  </p:timing>
-</p:sld>
-</file>
-
-<file path=ppt/slides/slide17.xml><?xml version="1.0" encoding="utf-8"?>
-<p:sld xmlns:a="http://schemas.openxmlformats.org/drawingml/2006/main" xmlns:r="http://schemas.openxmlformats.org/officeDocument/2006/relationships" xmlns:p="http://schemas.openxmlformats.org/presentationml/2006/main">
-  <p:cSld>
-    <p:spTree>
-      <p:nvGrpSpPr>
-        <p:cNvPr id="1" name=""/>
-        <p:cNvGrpSpPr/>
-        <p:nvPr/>
-      </p:nvGrpSpPr>
-      <p:grpSpPr>
-        <a:xfrm>
-          <a:off x="0" y="0"/>
-          <a:ext cx="0" cy="0"/>
-          <a:chOff x="0" y="0"/>
-          <a:chExt cx="0" cy="0"/>
-        </a:xfrm>
-      </p:grpSpPr>
-      <p:sp>
-        <p:nvSpPr>
-          <p:cNvPr id="3" name="Content Placeholder 2"/>
-          <p:cNvSpPr>
-            <a:spLocks noGrp="1"/>
-          </p:cNvSpPr>
-          <p:nvPr>
-            <p:ph idx="1"/>
-          </p:nvPr>
-        </p:nvSpPr>
-        <p:spPr/>
-        <p:txBody>
-          <a:bodyPr>
-            <a:normAutofit lnSpcReduction="10000"/>
-          </a:bodyPr>
-          <a:lstStyle/>
-          <a:p>
-            <a:pPr marL="0" indent="0">
-              <a:buNone/>
-            </a:pPr>
-            <a:r>
-              <a:rPr lang="en-US" dirty="0" smtClean="0"/>
-              <a:t>Create IAM User and Group:</a:t>
-            </a:r>
-          </a:p>
-          <a:p>
-            <a:r>
-              <a:rPr lang="en-US" dirty="0" smtClean="0"/>
-              <a:t>Create an IAM Group</a:t>
-            </a:r>
-          </a:p>
-          <a:p>
-            <a:r>
-              <a:rPr lang="en-US" dirty="0" smtClean="0"/>
-              <a:t>Create an IAM User</a:t>
-            </a:r>
-          </a:p>
-          <a:p>
-            <a:pPr marL="0" indent="0">
-              <a:buNone/>
-            </a:pPr>
-            <a:r>
-              <a:rPr lang="en-US" dirty="0" smtClean="0"/>
-              <a:t>Create a Limited Access IAM User and Test:</a:t>
-            </a:r>
-          </a:p>
-          <a:p>
-            <a:r>
-              <a:rPr lang="en-US" dirty="0" smtClean="0"/>
-              <a:t>Create an IAM Policy</a:t>
-            </a:r>
-          </a:p>
-          <a:p>
-            <a:r>
-              <a:rPr lang="en-US" dirty="0" smtClean="0"/>
-              <a:t>Create a user</a:t>
-            </a:r>
-          </a:p>
-          <a:p>
-            <a:r>
-              <a:rPr lang="en-US" dirty="0" smtClean="0"/>
-              <a:t>Apply Policy to user – allow access to resource by Tag</a:t>
-            </a:r>
-          </a:p>
-          <a:p>
-            <a:r>
-              <a:rPr lang="en-US" dirty="0" smtClean="0"/>
-              <a:t>Test Access Policy</a:t>
-            </a:r>
-          </a:p>
-          <a:p>
-            <a:pPr marL="0" indent="0">
-              <a:buNone/>
-            </a:pPr>
-            <a:endParaRPr lang="en-US" dirty="0" smtClean="0"/>
-          </a:p>
-        </p:txBody>
-      </p:sp>
-      <p:sp>
-        <p:nvSpPr>
-          <p:cNvPr id="2" name="Title 1"/>
-          <p:cNvSpPr>
-            <a:spLocks noGrp="1"/>
-          </p:cNvSpPr>
-          <p:nvPr>
-            <p:ph type="title"/>
-          </p:nvPr>
-        </p:nvSpPr>
-        <p:spPr/>
-        <p:txBody>
-          <a:bodyPr>
-            <a:normAutofit/>
-          </a:bodyPr>
-          <a:lstStyle/>
-          <a:p>
-            <a:r>
-              <a:rPr lang="en-US" dirty="0" smtClean="0"/>
-              <a:t>Hands On: IAM</a:t>
-            </a:r>
-            <a:endParaRPr lang="en-US" dirty="0"/>
-          </a:p>
-        </p:txBody>
-      </p:sp>
-    </p:spTree>
-    <p:extLst>
-      <p:ext uri="{BB962C8B-B14F-4D97-AF65-F5344CB8AC3E}">
-        <p14:creationId xmlns:p14="http://schemas.microsoft.com/office/powerpoint/2010/main" val="852108151"/>
       </p:ext>
     </p:extLst>
   </p:cSld>

</xml_diff>